<commit_message>
Added notes on vector timestamps.
</commit_message>
<xml_diff>
--- a/TimelineDiagrams/VectorTimestamps.pptx
+++ b/TimelineDiagrams/VectorTimestamps.pptx
@@ -15,6 +15,9 @@
     <p:sldId id="265" r:id="rId9"/>
     <p:sldId id="267" r:id="rId10"/>
     <p:sldId id="268" r:id="rId11"/>
+    <p:sldId id="272" r:id="rId12"/>
+    <p:sldId id="273" r:id="rId13"/>
+    <p:sldId id="271" r:id="rId14"/>
   </p:sldIdLst>
   <p:sldSz cx="9144000" cy="6858000" type="screen4x3"/>
   <p:notesSz cx="6858000" cy="9144000"/>
@@ -297,7 +300,7 @@
           <a:p>
             <a:fld id="{105C3B13-F58D-DE47-8BE9-3BA24CB0889F}" type="datetimeFigureOut">
               <a:rPr lang="en-US" smtClean="0"/>
-              <a:t>9/13/21</a:t>
+              <a:t>10/4/21</a:t>
             </a:fld>
             <a:endParaRPr lang="en-US"/>
           </a:p>
@@ -467,7 +470,7 @@
           <a:p>
             <a:fld id="{105C3B13-F58D-DE47-8BE9-3BA24CB0889F}" type="datetimeFigureOut">
               <a:rPr lang="en-US" smtClean="0"/>
-              <a:t>9/13/21</a:t>
+              <a:t>10/4/21</a:t>
             </a:fld>
             <a:endParaRPr lang="en-US"/>
           </a:p>
@@ -647,7 +650,7 @@
           <a:p>
             <a:fld id="{105C3B13-F58D-DE47-8BE9-3BA24CB0889F}" type="datetimeFigureOut">
               <a:rPr lang="en-US" smtClean="0"/>
-              <a:t>9/13/21</a:t>
+              <a:t>10/4/21</a:t>
             </a:fld>
             <a:endParaRPr lang="en-US"/>
           </a:p>
@@ -817,7 +820,7 @@
           <a:p>
             <a:fld id="{105C3B13-F58D-DE47-8BE9-3BA24CB0889F}" type="datetimeFigureOut">
               <a:rPr lang="en-US" smtClean="0"/>
-              <a:t>9/13/21</a:t>
+              <a:t>10/4/21</a:t>
             </a:fld>
             <a:endParaRPr lang="en-US"/>
           </a:p>
@@ -1063,7 +1066,7 @@
           <a:p>
             <a:fld id="{105C3B13-F58D-DE47-8BE9-3BA24CB0889F}" type="datetimeFigureOut">
               <a:rPr lang="en-US" smtClean="0"/>
-              <a:t>9/13/21</a:t>
+              <a:t>10/4/21</a:t>
             </a:fld>
             <a:endParaRPr lang="en-US"/>
           </a:p>
@@ -1351,7 +1354,7 @@
           <a:p>
             <a:fld id="{105C3B13-F58D-DE47-8BE9-3BA24CB0889F}" type="datetimeFigureOut">
               <a:rPr lang="en-US" smtClean="0"/>
-              <a:t>9/13/21</a:t>
+              <a:t>10/4/21</a:t>
             </a:fld>
             <a:endParaRPr lang="en-US"/>
           </a:p>
@@ -1773,7 +1776,7 @@
           <a:p>
             <a:fld id="{105C3B13-F58D-DE47-8BE9-3BA24CB0889F}" type="datetimeFigureOut">
               <a:rPr lang="en-US" smtClean="0"/>
-              <a:t>9/13/21</a:t>
+              <a:t>10/4/21</a:t>
             </a:fld>
             <a:endParaRPr lang="en-US"/>
           </a:p>
@@ -1891,7 +1894,7 @@
           <a:p>
             <a:fld id="{105C3B13-F58D-DE47-8BE9-3BA24CB0889F}" type="datetimeFigureOut">
               <a:rPr lang="en-US" smtClean="0"/>
-              <a:t>9/13/21</a:t>
+              <a:t>10/4/21</a:t>
             </a:fld>
             <a:endParaRPr lang="en-US"/>
           </a:p>
@@ -1986,7 +1989,7 @@
           <a:p>
             <a:fld id="{105C3B13-F58D-DE47-8BE9-3BA24CB0889F}" type="datetimeFigureOut">
               <a:rPr lang="en-US" smtClean="0"/>
-              <a:t>9/13/21</a:t>
+              <a:t>10/4/21</a:t>
             </a:fld>
             <a:endParaRPr lang="en-US"/>
           </a:p>
@@ -2263,7 +2266,7 @@
           <a:p>
             <a:fld id="{105C3B13-F58D-DE47-8BE9-3BA24CB0889F}" type="datetimeFigureOut">
               <a:rPr lang="en-US" smtClean="0"/>
-              <a:t>9/13/21</a:t>
+              <a:t>10/4/21</a:t>
             </a:fld>
             <a:endParaRPr lang="en-US"/>
           </a:p>
@@ -2516,7 +2519,7 @@
           <a:p>
             <a:fld id="{105C3B13-F58D-DE47-8BE9-3BA24CB0889F}" type="datetimeFigureOut">
               <a:rPr lang="en-US" smtClean="0"/>
-              <a:t>9/13/21</a:t>
+              <a:t>10/4/21</a:t>
             </a:fld>
             <a:endParaRPr lang="en-US"/>
           </a:p>
@@ -2729,7 +2732,7 @@
           <a:p>
             <a:fld id="{105C3B13-F58D-DE47-8BE9-3BA24CB0889F}" type="datetimeFigureOut">
               <a:rPr lang="en-US" smtClean="0"/>
-              <a:t>9/13/21</a:t>
+              <a:t>10/4/21</a:t>
             </a:fld>
             <a:endParaRPr lang="en-US"/>
           </a:p>
@@ -5284,6 +5287,3280 @@
       </p:par>
     </p:tnLst>
   </p:timing>
+</p:sld>
+</file>
+
+<file path=ppt/slides/slide11.xml><?xml version="1.0" encoding="utf-8"?>
+<p:sld xmlns:a="http://schemas.openxmlformats.org/drawingml/2006/main" xmlns:r="http://schemas.openxmlformats.org/officeDocument/2006/relationships" xmlns:p="http://schemas.openxmlformats.org/presentationml/2006/main">
+  <p:cSld>
+    <p:spTree>
+      <p:nvGrpSpPr>
+        <p:cNvPr id="1" name=""/>
+        <p:cNvGrpSpPr/>
+        <p:nvPr/>
+      </p:nvGrpSpPr>
+      <p:grpSpPr>
+        <a:xfrm>
+          <a:off x="0" y="0"/>
+          <a:ext cx="0" cy="0"/>
+          <a:chOff x="0" y="0"/>
+          <a:chExt cx="0" cy="0"/>
+        </a:xfrm>
+      </p:grpSpPr>
+      <p:sp>
+        <p:nvSpPr>
+          <p:cNvPr id="2" name="Oval 1"/>
+          <p:cNvSpPr/>
+          <p:nvPr/>
+        </p:nvSpPr>
+        <p:spPr>
+          <a:xfrm>
+            <a:off x="1284347" y="2647823"/>
+            <a:ext cx="914400" cy="914400"/>
+          </a:xfrm>
+          <a:prstGeom prst="ellipse">
+            <a:avLst/>
+          </a:prstGeom>
+          <a:noFill/>
+          <a:ln w="57150" cmpd="sng"/>
+        </p:spPr>
+        <p:style>
+          <a:lnRef idx="1">
+            <a:schemeClr val="accent1"/>
+          </a:lnRef>
+          <a:fillRef idx="3">
+            <a:schemeClr val="accent1"/>
+          </a:fillRef>
+          <a:effectRef idx="2">
+            <a:schemeClr val="accent1"/>
+          </a:effectRef>
+          <a:fontRef idx="minor">
+            <a:schemeClr val="lt1"/>
+          </a:fontRef>
+        </p:style>
+        <p:txBody>
+          <a:bodyPr rtlCol="0" anchor="ctr"/>
+          <a:lstStyle/>
+          <a:p>
+            <a:pPr algn="ctr"/>
+            <a:r>
+              <a:rPr lang="en-US" sz="4800" b="1" dirty="0" smtClean="0">
+                <a:solidFill>
+                  <a:srgbClr val="FF0000"/>
+                </a:solidFill>
+              </a:rPr>
+              <a:t>A</a:t>
+            </a:r>
+            <a:endParaRPr lang="en-US" sz="4800" b="1" dirty="0">
+              <a:solidFill>
+                <a:srgbClr val="FF0000"/>
+              </a:solidFill>
+            </a:endParaRPr>
+          </a:p>
+        </p:txBody>
+      </p:sp>
+      <p:sp>
+        <p:nvSpPr>
+          <p:cNvPr id="4" name="Oval 3"/>
+          <p:cNvSpPr/>
+          <p:nvPr/>
+        </p:nvSpPr>
+        <p:spPr>
+          <a:xfrm>
+            <a:off x="3505539" y="1470033"/>
+            <a:ext cx="914400" cy="914400"/>
+          </a:xfrm>
+          <a:prstGeom prst="ellipse">
+            <a:avLst/>
+          </a:prstGeom>
+          <a:noFill/>
+          <a:ln w="57150" cmpd="sng"/>
+        </p:spPr>
+        <p:style>
+          <a:lnRef idx="1">
+            <a:schemeClr val="accent1"/>
+          </a:lnRef>
+          <a:fillRef idx="3">
+            <a:schemeClr val="accent1"/>
+          </a:fillRef>
+          <a:effectRef idx="2">
+            <a:schemeClr val="accent1"/>
+          </a:effectRef>
+          <a:fontRef idx="minor">
+            <a:schemeClr val="lt1"/>
+          </a:fontRef>
+        </p:style>
+        <p:txBody>
+          <a:bodyPr rtlCol="0" anchor="ctr"/>
+          <a:lstStyle/>
+          <a:p>
+            <a:pPr algn="ctr"/>
+            <a:r>
+              <a:rPr lang="en-US" sz="4800" b="1" dirty="0" smtClean="0">
+                <a:solidFill>
+                  <a:srgbClr val="FF0000"/>
+                </a:solidFill>
+              </a:rPr>
+              <a:t>B</a:t>
+            </a:r>
+            <a:endParaRPr lang="en-US" sz="4800" b="1" dirty="0">
+              <a:solidFill>
+                <a:srgbClr val="FF0000"/>
+              </a:solidFill>
+            </a:endParaRPr>
+          </a:p>
+        </p:txBody>
+      </p:sp>
+      <p:sp>
+        <p:nvSpPr>
+          <p:cNvPr id="5" name="Oval 4"/>
+          <p:cNvSpPr/>
+          <p:nvPr/>
+        </p:nvSpPr>
+        <p:spPr>
+          <a:xfrm>
+            <a:off x="3779232" y="3875870"/>
+            <a:ext cx="914400" cy="914400"/>
+          </a:xfrm>
+          <a:prstGeom prst="ellipse">
+            <a:avLst/>
+          </a:prstGeom>
+          <a:noFill/>
+          <a:ln w="57150" cmpd="sng"/>
+        </p:spPr>
+        <p:style>
+          <a:lnRef idx="1">
+            <a:schemeClr val="accent1"/>
+          </a:lnRef>
+          <a:fillRef idx="3">
+            <a:schemeClr val="accent1"/>
+          </a:fillRef>
+          <a:effectRef idx="2">
+            <a:schemeClr val="accent1"/>
+          </a:effectRef>
+          <a:fontRef idx="minor">
+            <a:schemeClr val="lt1"/>
+          </a:fontRef>
+        </p:style>
+        <p:txBody>
+          <a:bodyPr rtlCol="0" anchor="ctr"/>
+          <a:lstStyle/>
+          <a:p>
+            <a:pPr algn="ctr"/>
+            <a:r>
+              <a:rPr lang="en-US" sz="4800" b="1" dirty="0" smtClean="0">
+                <a:solidFill>
+                  <a:srgbClr val="FF0000"/>
+                </a:solidFill>
+              </a:rPr>
+              <a:t>C</a:t>
+            </a:r>
+            <a:endParaRPr lang="en-US" sz="4800" b="1" dirty="0">
+              <a:solidFill>
+                <a:srgbClr val="FF0000"/>
+              </a:solidFill>
+            </a:endParaRPr>
+          </a:p>
+        </p:txBody>
+      </p:sp>
+      <p:cxnSp>
+        <p:nvCxnSpPr>
+          <p:cNvPr id="7" name="Straight Arrow Connector 6"/>
+          <p:cNvCxnSpPr>
+            <a:stCxn id="2" idx="6"/>
+          </p:cNvCxnSpPr>
+          <p:nvPr/>
+        </p:nvCxnSpPr>
+        <p:spPr>
+          <a:xfrm flipV="1">
+            <a:off x="2198747" y="3093477"/>
+            <a:ext cx="6742206" cy="11546"/>
+          </a:xfrm>
+          <a:prstGeom prst="straightConnector1">
+            <a:avLst/>
+          </a:prstGeom>
+          <a:ln w="76200" cmpd="sng">
+            <a:solidFill>
+              <a:srgbClr val="FF0000"/>
+            </a:solidFill>
+            <a:headEnd type="oval"/>
+            <a:tailEnd type="triangle"/>
+          </a:ln>
+        </p:spPr>
+        <p:style>
+          <a:lnRef idx="2">
+            <a:schemeClr val="accent1"/>
+          </a:lnRef>
+          <a:fillRef idx="0">
+            <a:schemeClr val="accent1"/>
+          </a:fillRef>
+          <a:effectRef idx="1">
+            <a:schemeClr val="accent1"/>
+          </a:effectRef>
+          <a:fontRef idx="minor">
+            <a:schemeClr val="tx1"/>
+          </a:fontRef>
+        </p:style>
+      </p:cxnSp>
+      <p:cxnSp>
+        <p:nvCxnSpPr>
+          <p:cNvPr id="9" name="Straight Arrow Connector 8"/>
+          <p:cNvCxnSpPr>
+            <a:stCxn id="4" idx="6"/>
+          </p:cNvCxnSpPr>
+          <p:nvPr/>
+        </p:nvCxnSpPr>
+        <p:spPr>
+          <a:xfrm>
+            <a:off x="4419939" y="1927233"/>
+            <a:ext cx="4262243" cy="0"/>
+          </a:xfrm>
+          <a:prstGeom prst="straightConnector1">
+            <a:avLst/>
+          </a:prstGeom>
+          <a:ln w="76200" cmpd="sng">
+            <a:solidFill>
+              <a:srgbClr val="FF0000"/>
+            </a:solidFill>
+            <a:headEnd type="oval"/>
+            <a:tailEnd type="triangle"/>
+          </a:ln>
+        </p:spPr>
+        <p:style>
+          <a:lnRef idx="2">
+            <a:schemeClr val="accent1"/>
+          </a:lnRef>
+          <a:fillRef idx="0">
+            <a:schemeClr val="accent1"/>
+          </a:fillRef>
+          <a:effectRef idx="1">
+            <a:schemeClr val="accent1"/>
+          </a:effectRef>
+          <a:fontRef idx="minor">
+            <a:schemeClr val="tx1"/>
+          </a:fontRef>
+        </p:style>
+      </p:cxnSp>
+      <p:cxnSp>
+        <p:nvCxnSpPr>
+          <p:cNvPr id="11" name="Straight Arrow Connector 10"/>
+          <p:cNvCxnSpPr>
+            <a:endCxn id="4" idx="2"/>
+          </p:cNvCxnSpPr>
+          <p:nvPr/>
+        </p:nvCxnSpPr>
+        <p:spPr>
+          <a:xfrm>
+            <a:off x="184727" y="1927233"/>
+            <a:ext cx="3320812" cy="0"/>
+          </a:xfrm>
+          <a:prstGeom prst="straightConnector1">
+            <a:avLst/>
+          </a:prstGeom>
+          <a:ln w="76200" cmpd="sng">
+            <a:solidFill>
+              <a:srgbClr val="FF0000"/>
+            </a:solidFill>
+            <a:tailEnd type="arrow"/>
+          </a:ln>
+        </p:spPr>
+        <p:style>
+          <a:lnRef idx="2">
+            <a:schemeClr val="accent1"/>
+          </a:lnRef>
+          <a:fillRef idx="0">
+            <a:schemeClr val="accent1"/>
+          </a:fillRef>
+          <a:effectRef idx="1">
+            <a:schemeClr val="accent1"/>
+          </a:effectRef>
+          <a:fontRef idx="minor">
+            <a:schemeClr val="tx1"/>
+          </a:fontRef>
+        </p:style>
+      </p:cxnSp>
+      <p:cxnSp>
+        <p:nvCxnSpPr>
+          <p:cNvPr id="26" name="Straight Arrow Connector 25"/>
+          <p:cNvCxnSpPr>
+            <a:stCxn id="5" idx="6"/>
+          </p:cNvCxnSpPr>
+          <p:nvPr/>
+        </p:nvCxnSpPr>
+        <p:spPr>
+          <a:xfrm>
+            <a:off x="4693632" y="4333070"/>
+            <a:ext cx="4150377" cy="8946"/>
+          </a:xfrm>
+          <a:prstGeom prst="straightConnector1">
+            <a:avLst/>
+          </a:prstGeom>
+          <a:ln w="76200" cmpd="sng">
+            <a:solidFill>
+              <a:srgbClr val="FF0000"/>
+            </a:solidFill>
+            <a:headEnd type="oval"/>
+            <a:tailEnd type="triangle"/>
+          </a:ln>
+        </p:spPr>
+        <p:style>
+          <a:lnRef idx="2">
+            <a:schemeClr val="accent1"/>
+          </a:lnRef>
+          <a:fillRef idx="0">
+            <a:schemeClr val="accent1"/>
+          </a:fillRef>
+          <a:effectRef idx="1">
+            <a:schemeClr val="accent1"/>
+          </a:effectRef>
+          <a:fontRef idx="minor">
+            <a:schemeClr val="tx1"/>
+          </a:fontRef>
+        </p:style>
+      </p:cxnSp>
+      <p:cxnSp>
+        <p:nvCxnSpPr>
+          <p:cNvPr id="28" name="Straight Arrow Connector 27"/>
+          <p:cNvCxnSpPr>
+            <a:stCxn id="5" idx="2"/>
+          </p:cNvCxnSpPr>
+          <p:nvPr/>
+        </p:nvCxnSpPr>
+        <p:spPr>
+          <a:xfrm flipH="1">
+            <a:off x="307701" y="4333070"/>
+            <a:ext cx="3471531" cy="8946"/>
+          </a:xfrm>
+          <a:prstGeom prst="straightConnector1">
+            <a:avLst/>
+          </a:prstGeom>
+          <a:ln w="76200" cmpd="sng">
+            <a:solidFill>
+              <a:srgbClr val="FF0000"/>
+            </a:solidFill>
+            <a:headEnd type="arrow"/>
+            <a:tailEnd type="none"/>
+          </a:ln>
+        </p:spPr>
+        <p:style>
+          <a:lnRef idx="2">
+            <a:schemeClr val="accent1"/>
+          </a:lnRef>
+          <a:fillRef idx="0">
+            <a:schemeClr val="accent1"/>
+          </a:fillRef>
+          <a:effectRef idx="1">
+            <a:schemeClr val="accent1"/>
+          </a:effectRef>
+          <a:fontRef idx="minor">
+            <a:schemeClr val="tx1"/>
+          </a:fontRef>
+        </p:style>
+      </p:cxnSp>
+      <p:cxnSp>
+        <p:nvCxnSpPr>
+          <p:cNvPr id="31" name="Straight Arrow Connector 30"/>
+          <p:cNvCxnSpPr>
+            <a:stCxn id="2" idx="2"/>
+          </p:cNvCxnSpPr>
+          <p:nvPr/>
+        </p:nvCxnSpPr>
+        <p:spPr>
+          <a:xfrm flipH="1">
+            <a:off x="258771" y="3105023"/>
+            <a:ext cx="1025576" cy="0"/>
+          </a:xfrm>
+          <a:prstGeom prst="straightConnector1">
+            <a:avLst/>
+          </a:prstGeom>
+          <a:ln w="76200" cmpd="sng">
+            <a:solidFill>
+              <a:srgbClr val="FF0000"/>
+            </a:solidFill>
+            <a:headEnd type="arrow"/>
+            <a:tailEnd type="none"/>
+          </a:ln>
+        </p:spPr>
+        <p:style>
+          <a:lnRef idx="2">
+            <a:schemeClr val="accent1"/>
+          </a:lnRef>
+          <a:fillRef idx="0">
+            <a:schemeClr val="accent1"/>
+          </a:fillRef>
+          <a:effectRef idx="1">
+            <a:schemeClr val="accent1"/>
+          </a:effectRef>
+          <a:fontRef idx="minor">
+            <a:schemeClr val="tx1"/>
+          </a:fontRef>
+        </p:style>
+      </p:cxnSp>
+      <p:sp>
+        <p:nvSpPr>
+          <p:cNvPr id="38" name="Oval 37"/>
+          <p:cNvSpPr/>
+          <p:nvPr/>
+        </p:nvSpPr>
+        <p:spPr>
+          <a:xfrm>
+            <a:off x="6579657" y="4660961"/>
+            <a:ext cx="914400" cy="914400"/>
+          </a:xfrm>
+          <a:prstGeom prst="ellipse">
+            <a:avLst/>
+          </a:prstGeom>
+          <a:noFill/>
+          <a:ln w="57150" cmpd="sng"/>
+        </p:spPr>
+        <p:style>
+          <a:lnRef idx="1">
+            <a:schemeClr val="accent1"/>
+          </a:lnRef>
+          <a:fillRef idx="3">
+            <a:schemeClr val="accent1"/>
+          </a:fillRef>
+          <a:effectRef idx="2">
+            <a:schemeClr val="accent1"/>
+          </a:effectRef>
+          <a:fontRef idx="minor">
+            <a:schemeClr val="lt1"/>
+          </a:fontRef>
+        </p:style>
+        <p:txBody>
+          <a:bodyPr rtlCol="0" anchor="ctr"/>
+          <a:lstStyle/>
+          <a:p>
+            <a:pPr algn="ctr"/>
+            <a:r>
+              <a:rPr lang="en-US" sz="4800" b="1" dirty="0" smtClean="0">
+                <a:solidFill>
+                  <a:srgbClr val="FF0000"/>
+                </a:solidFill>
+              </a:rPr>
+              <a:t>E</a:t>
+            </a:r>
+            <a:endParaRPr lang="en-US" sz="4800" b="1" dirty="0">
+              <a:solidFill>
+                <a:srgbClr val="FF0000"/>
+              </a:solidFill>
+            </a:endParaRPr>
+          </a:p>
+        </p:txBody>
+      </p:sp>
+      <p:cxnSp>
+        <p:nvCxnSpPr>
+          <p:cNvPr id="55" name="Straight Arrow Connector 54"/>
+          <p:cNvCxnSpPr>
+            <a:stCxn id="38" idx="2"/>
+          </p:cNvCxnSpPr>
+          <p:nvPr/>
+        </p:nvCxnSpPr>
+        <p:spPr>
+          <a:xfrm flipH="1">
+            <a:off x="307700" y="5118161"/>
+            <a:ext cx="6271957" cy="0"/>
+          </a:xfrm>
+          <a:prstGeom prst="straightConnector1">
+            <a:avLst/>
+          </a:prstGeom>
+          <a:ln w="76200" cmpd="sng">
+            <a:solidFill>
+              <a:srgbClr val="FF0000"/>
+            </a:solidFill>
+            <a:headEnd type="arrow"/>
+            <a:tailEnd type="none"/>
+          </a:ln>
+        </p:spPr>
+        <p:style>
+          <a:lnRef idx="2">
+            <a:schemeClr val="accent1"/>
+          </a:lnRef>
+          <a:fillRef idx="0">
+            <a:schemeClr val="accent1"/>
+          </a:fillRef>
+          <a:effectRef idx="1">
+            <a:schemeClr val="accent1"/>
+          </a:effectRef>
+          <a:fontRef idx="minor">
+            <a:schemeClr val="tx1"/>
+          </a:fontRef>
+        </p:style>
+      </p:cxnSp>
+      <p:cxnSp>
+        <p:nvCxnSpPr>
+          <p:cNvPr id="63" name="Straight Arrow Connector 62"/>
+          <p:cNvCxnSpPr>
+            <a:stCxn id="38" idx="6"/>
+          </p:cNvCxnSpPr>
+          <p:nvPr/>
+        </p:nvCxnSpPr>
+        <p:spPr>
+          <a:xfrm>
+            <a:off x="7494057" y="5118161"/>
+            <a:ext cx="1349952" cy="0"/>
+          </a:xfrm>
+          <a:prstGeom prst="straightConnector1">
+            <a:avLst/>
+          </a:prstGeom>
+          <a:ln w="76200" cmpd="sng">
+            <a:solidFill>
+              <a:srgbClr val="FF0000"/>
+            </a:solidFill>
+            <a:headEnd type="oval"/>
+            <a:tailEnd type="triangle"/>
+          </a:ln>
+        </p:spPr>
+        <p:style>
+          <a:lnRef idx="2">
+            <a:schemeClr val="accent1"/>
+          </a:lnRef>
+          <a:fillRef idx="0">
+            <a:schemeClr val="accent1"/>
+          </a:fillRef>
+          <a:effectRef idx="1">
+            <a:schemeClr val="accent1"/>
+          </a:effectRef>
+          <a:fontRef idx="minor">
+            <a:schemeClr val="tx1"/>
+          </a:fontRef>
+        </p:style>
+      </p:cxnSp>
+      <p:cxnSp>
+        <p:nvCxnSpPr>
+          <p:cNvPr id="13" name="Straight Arrow Connector 12"/>
+          <p:cNvCxnSpPr>
+            <a:stCxn id="38" idx="0"/>
+            <a:endCxn id="39" idx="4"/>
+          </p:cNvCxnSpPr>
+          <p:nvPr/>
+        </p:nvCxnSpPr>
+        <p:spPr>
+          <a:xfrm flipV="1">
+            <a:off x="7036857" y="3486760"/>
+            <a:ext cx="811716" cy="1174201"/>
+          </a:xfrm>
+          <a:prstGeom prst="straightConnector1">
+            <a:avLst/>
+          </a:prstGeom>
+          <a:ln>
+            <a:tailEnd type="arrow"/>
+          </a:ln>
+        </p:spPr>
+        <p:style>
+          <a:lnRef idx="2">
+            <a:schemeClr val="accent1"/>
+          </a:lnRef>
+          <a:fillRef idx="0">
+            <a:schemeClr val="accent1"/>
+          </a:fillRef>
+          <a:effectRef idx="1">
+            <a:schemeClr val="accent1"/>
+          </a:effectRef>
+          <a:fontRef idx="minor">
+            <a:schemeClr val="tx1"/>
+          </a:fontRef>
+        </p:style>
+      </p:cxnSp>
+      <p:sp>
+        <p:nvSpPr>
+          <p:cNvPr id="39" name="Oval 38"/>
+          <p:cNvSpPr/>
+          <p:nvPr/>
+        </p:nvSpPr>
+        <p:spPr>
+          <a:xfrm>
+            <a:off x="7391373" y="2572360"/>
+            <a:ext cx="914400" cy="914400"/>
+          </a:xfrm>
+          <a:prstGeom prst="ellipse">
+            <a:avLst/>
+          </a:prstGeom>
+          <a:solidFill>
+            <a:schemeClr val="bg1"/>
+          </a:solidFill>
+          <a:ln w="57150" cmpd="sng"/>
+        </p:spPr>
+        <p:style>
+          <a:lnRef idx="1">
+            <a:schemeClr val="accent1"/>
+          </a:lnRef>
+          <a:fillRef idx="3">
+            <a:schemeClr val="accent1"/>
+          </a:fillRef>
+          <a:effectRef idx="2">
+            <a:schemeClr val="accent1"/>
+          </a:effectRef>
+          <a:fontRef idx="minor">
+            <a:schemeClr val="lt1"/>
+          </a:fontRef>
+        </p:style>
+        <p:txBody>
+          <a:bodyPr rtlCol="0" anchor="ctr"/>
+          <a:lstStyle/>
+          <a:p>
+            <a:pPr algn="ctr"/>
+            <a:r>
+              <a:rPr lang="en-US" sz="4800" b="1" dirty="0" smtClean="0">
+                <a:solidFill>
+                  <a:srgbClr val="FF0000"/>
+                </a:solidFill>
+              </a:rPr>
+              <a:t> </a:t>
+            </a:r>
+            <a:r>
+              <a:rPr lang="en-US" sz="4800" b="1" dirty="0" smtClean="0">
+                <a:solidFill>
+                  <a:srgbClr val="FF0000"/>
+                </a:solidFill>
+              </a:rPr>
+              <a:t>F</a:t>
+            </a:r>
+            <a:endParaRPr lang="en-US" sz="4800" b="1" dirty="0">
+              <a:solidFill>
+                <a:srgbClr val="FF0000"/>
+              </a:solidFill>
+            </a:endParaRPr>
+          </a:p>
+        </p:txBody>
+      </p:sp>
+      <p:sp>
+        <p:nvSpPr>
+          <p:cNvPr id="50" name="Oval 49"/>
+          <p:cNvSpPr/>
+          <p:nvPr/>
+        </p:nvSpPr>
+        <p:spPr>
+          <a:xfrm>
+            <a:off x="4840845" y="2661162"/>
+            <a:ext cx="914400" cy="914400"/>
+          </a:xfrm>
+          <a:prstGeom prst="ellipse">
+            <a:avLst/>
+          </a:prstGeom>
+          <a:solidFill>
+            <a:srgbClr val="FF0000"/>
+          </a:solidFill>
+          <a:ln w="57150" cmpd="sng"/>
+        </p:spPr>
+        <p:style>
+          <a:lnRef idx="1">
+            <a:schemeClr val="accent1"/>
+          </a:lnRef>
+          <a:fillRef idx="3">
+            <a:schemeClr val="accent1"/>
+          </a:fillRef>
+          <a:effectRef idx="2">
+            <a:schemeClr val="accent1"/>
+          </a:effectRef>
+          <a:fontRef idx="minor">
+            <a:schemeClr val="lt1"/>
+          </a:fontRef>
+        </p:style>
+        <p:txBody>
+          <a:bodyPr rtlCol="0" anchor="ctr"/>
+          <a:lstStyle/>
+          <a:p>
+            <a:pPr algn="ctr"/>
+            <a:r>
+              <a:rPr lang="en-US" sz="4800" b="1" dirty="0" smtClean="0">
+                <a:solidFill>
+                  <a:schemeClr val="bg1"/>
+                </a:solidFill>
+              </a:rPr>
+              <a:t>D</a:t>
+            </a:r>
+            <a:endParaRPr lang="en-US" sz="4800" b="1" dirty="0">
+              <a:solidFill>
+                <a:schemeClr val="bg1"/>
+              </a:solidFill>
+            </a:endParaRPr>
+          </a:p>
+        </p:txBody>
+      </p:sp>
+      <p:cxnSp>
+        <p:nvCxnSpPr>
+          <p:cNvPr id="19" name="Straight Arrow Connector 18"/>
+          <p:cNvCxnSpPr>
+            <a:stCxn id="4" idx="5"/>
+            <a:endCxn id="50" idx="1"/>
+          </p:cNvCxnSpPr>
+          <p:nvPr/>
+        </p:nvCxnSpPr>
+        <p:spPr>
+          <a:xfrm>
+            <a:off x="4286028" y="2250522"/>
+            <a:ext cx="688728" cy="544551"/>
+          </a:xfrm>
+          <a:prstGeom prst="straightConnector1">
+            <a:avLst/>
+          </a:prstGeom>
+          <a:ln>
+            <a:tailEnd type="arrow"/>
+          </a:ln>
+        </p:spPr>
+        <p:style>
+          <a:lnRef idx="2">
+            <a:schemeClr val="accent1"/>
+          </a:lnRef>
+          <a:fillRef idx="0">
+            <a:schemeClr val="accent1"/>
+          </a:fillRef>
+          <a:effectRef idx="1">
+            <a:schemeClr val="accent1"/>
+          </a:effectRef>
+          <a:fontRef idx="minor">
+            <a:schemeClr val="tx1"/>
+          </a:fontRef>
+        </p:style>
+      </p:cxnSp>
+      <p:cxnSp>
+        <p:nvCxnSpPr>
+          <p:cNvPr id="10" name="Straight Arrow Connector 9"/>
+          <p:cNvCxnSpPr>
+            <a:stCxn id="5" idx="7"/>
+          </p:cNvCxnSpPr>
+          <p:nvPr/>
+        </p:nvCxnSpPr>
+        <p:spPr>
+          <a:xfrm flipV="1">
+            <a:off x="4559721" y="3575562"/>
+            <a:ext cx="663959" cy="434219"/>
+          </a:xfrm>
+          <a:prstGeom prst="straightConnector1">
+            <a:avLst/>
+          </a:prstGeom>
+          <a:ln>
+            <a:tailEnd type="arrow"/>
+          </a:ln>
+        </p:spPr>
+        <p:style>
+          <a:lnRef idx="2">
+            <a:schemeClr val="accent1"/>
+          </a:lnRef>
+          <a:fillRef idx="0">
+            <a:schemeClr val="accent1"/>
+          </a:fillRef>
+          <a:effectRef idx="1">
+            <a:schemeClr val="accent1"/>
+          </a:effectRef>
+          <a:fontRef idx="minor">
+            <a:schemeClr val="tx1"/>
+          </a:fontRef>
+        </p:style>
+      </p:cxnSp>
+      <p:sp>
+        <p:nvSpPr>
+          <p:cNvPr id="16" name="TextBox 15"/>
+          <p:cNvSpPr txBox="1"/>
+          <p:nvPr/>
+        </p:nvSpPr>
+        <p:spPr>
+          <a:xfrm>
+            <a:off x="267269" y="941877"/>
+            <a:ext cx="574647" cy="1015663"/>
+          </a:xfrm>
+          <a:prstGeom prst="rect">
+            <a:avLst/>
+          </a:prstGeom>
+          <a:noFill/>
+        </p:spPr>
+        <p:txBody>
+          <a:bodyPr wrap="none" rtlCol="0">
+            <a:spAutoFit/>
+          </a:bodyPr>
+          <a:lstStyle/>
+          <a:p>
+            <a:r>
+              <a:rPr lang="en-US" sz="6000" b="1" dirty="0" smtClean="0"/>
+              <a:t>0</a:t>
+            </a:r>
+            <a:endParaRPr lang="en-US" sz="6000" b="1" dirty="0"/>
+          </a:p>
+        </p:txBody>
+      </p:sp>
+      <p:sp>
+        <p:nvSpPr>
+          <p:cNvPr id="40" name="TextBox 39"/>
+          <p:cNvSpPr txBox="1"/>
+          <p:nvPr/>
+        </p:nvSpPr>
+        <p:spPr>
+          <a:xfrm>
+            <a:off x="228836" y="2095094"/>
+            <a:ext cx="574647" cy="1015663"/>
+          </a:xfrm>
+          <a:prstGeom prst="rect">
+            <a:avLst/>
+          </a:prstGeom>
+          <a:noFill/>
+        </p:spPr>
+        <p:txBody>
+          <a:bodyPr wrap="none" rtlCol="0">
+            <a:spAutoFit/>
+          </a:bodyPr>
+          <a:lstStyle/>
+          <a:p>
+            <a:r>
+              <a:rPr lang="en-US" sz="6000" b="1" dirty="0"/>
+              <a:t>1</a:t>
+            </a:r>
+            <a:endParaRPr lang="en-US" sz="6000" b="1" dirty="0"/>
+          </a:p>
+        </p:txBody>
+      </p:sp>
+      <p:sp>
+        <p:nvSpPr>
+          <p:cNvPr id="43" name="TextBox 42"/>
+          <p:cNvSpPr txBox="1"/>
+          <p:nvPr/>
+        </p:nvSpPr>
+        <p:spPr>
+          <a:xfrm>
+            <a:off x="312268" y="3326353"/>
+            <a:ext cx="574647" cy="1015663"/>
+          </a:xfrm>
+          <a:prstGeom prst="rect">
+            <a:avLst/>
+          </a:prstGeom>
+          <a:noFill/>
+        </p:spPr>
+        <p:txBody>
+          <a:bodyPr wrap="none" rtlCol="0">
+            <a:spAutoFit/>
+          </a:bodyPr>
+          <a:lstStyle/>
+          <a:p>
+            <a:r>
+              <a:rPr lang="en-US" sz="6000" b="1" dirty="0" smtClean="0"/>
+              <a:t>2</a:t>
+            </a:r>
+            <a:endParaRPr lang="en-US" sz="6000" b="1" dirty="0"/>
+          </a:p>
+        </p:txBody>
+      </p:sp>
+      <p:sp>
+        <p:nvSpPr>
+          <p:cNvPr id="44" name="TextBox 43"/>
+          <p:cNvSpPr txBox="1"/>
+          <p:nvPr/>
+        </p:nvSpPr>
+        <p:spPr>
+          <a:xfrm>
+            <a:off x="312268" y="4228283"/>
+            <a:ext cx="574647" cy="1015663"/>
+          </a:xfrm>
+          <a:prstGeom prst="rect">
+            <a:avLst/>
+          </a:prstGeom>
+          <a:noFill/>
+        </p:spPr>
+        <p:txBody>
+          <a:bodyPr wrap="none" rtlCol="0">
+            <a:spAutoFit/>
+          </a:bodyPr>
+          <a:lstStyle/>
+          <a:p>
+            <a:r>
+              <a:rPr lang="en-US" sz="6000" b="1" dirty="0"/>
+              <a:t>3</a:t>
+            </a:r>
+            <a:endParaRPr lang="en-US" sz="6000" b="1" dirty="0"/>
+          </a:p>
+        </p:txBody>
+      </p:sp>
+      <p:sp>
+        <p:nvSpPr>
+          <p:cNvPr id="45" name="TextBox 44"/>
+          <p:cNvSpPr txBox="1"/>
+          <p:nvPr/>
+        </p:nvSpPr>
+        <p:spPr>
+          <a:xfrm>
+            <a:off x="4693632" y="2024166"/>
+            <a:ext cx="2086829" cy="584776"/>
+          </a:xfrm>
+          <a:prstGeom prst="rect">
+            <a:avLst/>
+          </a:prstGeom>
+          <a:solidFill>
+            <a:srgbClr val="FFFF00"/>
+          </a:solidFill>
+        </p:spPr>
+        <p:txBody>
+          <a:bodyPr wrap="none" rtlCol="0">
+            <a:spAutoFit/>
+          </a:bodyPr>
+          <a:lstStyle/>
+          <a:p>
+            <a:r>
+              <a:rPr lang="en-US" sz="3200" b="1" dirty="0" smtClean="0"/>
+              <a:t>[10, </a:t>
+            </a:r>
+            <a:r>
+              <a:rPr lang="en-US" sz="3200" b="1" dirty="0" smtClean="0"/>
+              <a:t>5</a:t>
+            </a:r>
+            <a:r>
+              <a:rPr lang="en-US" sz="3200" b="1" dirty="0" smtClean="0"/>
+              <a:t>, </a:t>
+            </a:r>
+            <a:r>
+              <a:rPr lang="en-US" sz="3200" b="1" dirty="0" smtClean="0"/>
+              <a:t>3</a:t>
+            </a:r>
+            <a:r>
+              <a:rPr lang="en-US" sz="3200" b="1" dirty="0" smtClean="0"/>
+              <a:t>, </a:t>
+            </a:r>
+            <a:r>
+              <a:rPr lang="en-US" sz="3200" b="1" dirty="0"/>
+              <a:t>2</a:t>
+            </a:r>
+            <a:r>
+              <a:rPr lang="en-US" sz="3200" b="1" dirty="0" smtClean="0"/>
+              <a:t>]</a:t>
+            </a:r>
+            <a:endParaRPr lang="en-US" sz="3200" b="1" dirty="0"/>
+          </a:p>
+        </p:txBody>
+      </p:sp>
+      <p:sp>
+        <p:nvSpPr>
+          <p:cNvPr id="46" name="TextBox 45"/>
+          <p:cNvSpPr txBox="1"/>
+          <p:nvPr/>
+        </p:nvSpPr>
+        <p:spPr>
+          <a:xfrm>
+            <a:off x="2839812" y="2450450"/>
+            <a:ext cx="1878840" cy="584776"/>
+          </a:xfrm>
+          <a:prstGeom prst="rect">
+            <a:avLst/>
+          </a:prstGeom>
+          <a:solidFill>
+            <a:srgbClr val="FFFF00"/>
+          </a:solidFill>
+        </p:spPr>
+        <p:txBody>
+          <a:bodyPr wrap="none" rtlCol="0">
+            <a:spAutoFit/>
+          </a:bodyPr>
+          <a:lstStyle/>
+          <a:p>
+            <a:r>
+              <a:rPr lang="en-US" sz="3200" b="1" dirty="0" smtClean="0"/>
+              <a:t>[3, </a:t>
+            </a:r>
+            <a:r>
+              <a:rPr lang="en-US" sz="3200" b="1" dirty="0" smtClean="0"/>
+              <a:t>8</a:t>
+            </a:r>
+            <a:r>
+              <a:rPr lang="en-US" sz="3200" b="1" dirty="0" smtClean="0"/>
+              <a:t>, </a:t>
+            </a:r>
+            <a:r>
+              <a:rPr lang="en-US" sz="3200" b="1" dirty="0"/>
+              <a:t>2</a:t>
+            </a:r>
+            <a:r>
+              <a:rPr lang="en-US" sz="3200" b="1" dirty="0" smtClean="0"/>
+              <a:t>, </a:t>
+            </a:r>
+            <a:r>
+              <a:rPr lang="en-US" sz="3200" b="1" dirty="0"/>
+              <a:t>1</a:t>
+            </a:r>
+            <a:r>
+              <a:rPr lang="en-US" sz="3200" b="1" dirty="0" smtClean="0"/>
+              <a:t>]</a:t>
+            </a:r>
+            <a:endParaRPr lang="en-US" sz="3200" b="1" dirty="0"/>
+          </a:p>
+        </p:txBody>
+      </p:sp>
+      <p:sp>
+        <p:nvSpPr>
+          <p:cNvPr id="47" name="TextBox 46"/>
+          <p:cNvSpPr txBox="1"/>
+          <p:nvPr/>
+        </p:nvSpPr>
+        <p:spPr>
+          <a:xfrm>
+            <a:off x="4974756" y="3562223"/>
+            <a:ext cx="1878840" cy="584776"/>
+          </a:xfrm>
+          <a:prstGeom prst="rect">
+            <a:avLst/>
+          </a:prstGeom>
+          <a:solidFill>
+            <a:srgbClr val="FFFF00"/>
+          </a:solidFill>
+        </p:spPr>
+        <p:txBody>
+          <a:bodyPr wrap="none" rtlCol="0">
+            <a:spAutoFit/>
+          </a:bodyPr>
+          <a:lstStyle/>
+          <a:p>
+            <a:r>
+              <a:rPr lang="en-US" sz="3200" b="1" dirty="0" smtClean="0"/>
+              <a:t>[6, </a:t>
+            </a:r>
+            <a:r>
+              <a:rPr lang="en-US" sz="3200" b="1" dirty="0"/>
+              <a:t>3</a:t>
+            </a:r>
+            <a:r>
+              <a:rPr lang="en-US" sz="3200" b="1" dirty="0" smtClean="0"/>
+              <a:t>, </a:t>
+            </a:r>
+            <a:r>
+              <a:rPr lang="en-US" sz="3200" b="1" dirty="0" smtClean="0"/>
+              <a:t>4</a:t>
+            </a:r>
+            <a:r>
+              <a:rPr lang="en-US" sz="3200" b="1" dirty="0" smtClean="0"/>
+              <a:t>, </a:t>
+            </a:r>
+            <a:r>
+              <a:rPr lang="en-US" sz="3200" b="1" dirty="0"/>
+              <a:t>1</a:t>
+            </a:r>
+            <a:r>
+              <a:rPr lang="en-US" sz="3200" b="1" dirty="0" smtClean="0"/>
+              <a:t>]</a:t>
+            </a:r>
+            <a:endParaRPr lang="en-US" sz="3200" b="1" dirty="0"/>
+          </a:p>
+        </p:txBody>
+      </p:sp>
+      <p:sp>
+        <p:nvSpPr>
+          <p:cNvPr id="17" name="TextBox 16"/>
+          <p:cNvSpPr txBox="1"/>
+          <p:nvPr/>
+        </p:nvSpPr>
+        <p:spPr>
+          <a:xfrm>
+            <a:off x="4483057" y="254384"/>
+            <a:ext cx="1481245" cy="769441"/>
+          </a:xfrm>
+          <a:prstGeom prst="rect">
+            <a:avLst/>
+          </a:prstGeom>
+          <a:noFill/>
+        </p:spPr>
+        <p:txBody>
+          <a:bodyPr wrap="none" rtlCol="0">
+            <a:spAutoFit/>
+          </a:bodyPr>
+          <a:lstStyle/>
+          <a:p>
+            <a:r>
+              <a:rPr lang="en-US" sz="4400" dirty="0" smtClean="0"/>
+              <a:t>Event</a:t>
+            </a:r>
+            <a:endParaRPr lang="en-US" sz="4400" dirty="0"/>
+          </a:p>
+        </p:txBody>
+      </p:sp>
+      <p:cxnSp>
+        <p:nvCxnSpPr>
+          <p:cNvPr id="20" name="Straight Arrow Connector 19"/>
+          <p:cNvCxnSpPr>
+            <a:stCxn id="17" idx="2"/>
+            <a:endCxn id="4" idx="0"/>
+          </p:cNvCxnSpPr>
+          <p:nvPr/>
+        </p:nvCxnSpPr>
+        <p:spPr>
+          <a:xfrm flipH="1">
+            <a:off x="3962739" y="1023825"/>
+            <a:ext cx="1260941" cy="446208"/>
+          </a:xfrm>
+          <a:prstGeom prst="straightConnector1">
+            <a:avLst/>
+          </a:prstGeom>
+          <a:ln>
+            <a:prstDash val="dash"/>
+            <a:tailEnd type="arrow"/>
+          </a:ln>
+        </p:spPr>
+        <p:style>
+          <a:lnRef idx="2">
+            <a:schemeClr val="accent1"/>
+          </a:lnRef>
+          <a:fillRef idx="0">
+            <a:schemeClr val="accent1"/>
+          </a:fillRef>
+          <a:effectRef idx="1">
+            <a:schemeClr val="accent1"/>
+          </a:effectRef>
+          <a:fontRef idx="minor">
+            <a:schemeClr val="tx1"/>
+          </a:fontRef>
+        </p:style>
+      </p:cxnSp>
+      <p:sp>
+        <p:nvSpPr>
+          <p:cNvPr id="49" name="TextBox 48"/>
+          <p:cNvSpPr txBox="1"/>
+          <p:nvPr/>
+        </p:nvSpPr>
+        <p:spPr>
+          <a:xfrm>
+            <a:off x="6017477" y="890082"/>
+            <a:ext cx="2747792" cy="769441"/>
+          </a:xfrm>
+          <a:prstGeom prst="rect">
+            <a:avLst/>
+          </a:prstGeom>
+          <a:noFill/>
+        </p:spPr>
+        <p:txBody>
+          <a:bodyPr wrap="none" rtlCol="0">
+            <a:spAutoFit/>
+          </a:bodyPr>
+          <a:lstStyle/>
+          <a:p>
+            <a:r>
+              <a:rPr lang="en-US" sz="4400" dirty="0" smtClean="0"/>
+              <a:t>Timestamp</a:t>
+            </a:r>
+            <a:endParaRPr lang="en-US" sz="4400" dirty="0"/>
+          </a:p>
+        </p:txBody>
+      </p:sp>
+      <p:cxnSp>
+        <p:nvCxnSpPr>
+          <p:cNvPr id="22" name="Straight Arrow Connector 21"/>
+          <p:cNvCxnSpPr>
+            <a:stCxn id="49" idx="2"/>
+          </p:cNvCxnSpPr>
+          <p:nvPr/>
+        </p:nvCxnSpPr>
+        <p:spPr>
+          <a:xfrm flipH="1">
+            <a:off x="6572472" y="1659523"/>
+            <a:ext cx="818901" cy="429409"/>
+          </a:xfrm>
+          <a:prstGeom prst="straightConnector1">
+            <a:avLst/>
+          </a:prstGeom>
+          <a:ln>
+            <a:prstDash val="dash"/>
+            <a:tailEnd type="arrow"/>
+          </a:ln>
+        </p:spPr>
+        <p:style>
+          <a:lnRef idx="2">
+            <a:schemeClr val="accent1"/>
+          </a:lnRef>
+          <a:fillRef idx="0">
+            <a:schemeClr val="accent1"/>
+          </a:fillRef>
+          <a:effectRef idx="1">
+            <a:schemeClr val="accent1"/>
+          </a:effectRef>
+          <a:fontRef idx="minor">
+            <a:schemeClr val="tx1"/>
+          </a:fontRef>
+        </p:style>
+      </p:cxnSp>
+      <p:cxnSp>
+        <p:nvCxnSpPr>
+          <p:cNvPr id="51" name="Straight Arrow Connector 50"/>
+          <p:cNvCxnSpPr>
+            <a:stCxn id="49" idx="2"/>
+            <a:endCxn id="47" idx="0"/>
+          </p:cNvCxnSpPr>
+          <p:nvPr/>
+        </p:nvCxnSpPr>
+        <p:spPr>
+          <a:xfrm flipH="1">
+            <a:off x="5914176" y="1659523"/>
+            <a:ext cx="1477197" cy="1902700"/>
+          </a:xfrm>
+          <a:prstGeom prst="straightConnector1">
+            <a:avLst/>
+          </a:prstGeom>
+          <a:ln>
+            <a:prstDash val="dash"/>
+            <a:tailEnd type="arrow"/>
+          </a:ln>
+        </p:spPr>
+        <p:style>
+          <a:lnRef idx="2">
+            <a:schemeClr val="accent1"/>
+          </a:lnRef>
+          <a:fillRef idx="0">
+            <a:schemeClr val="accent1"/>
+          </a:fillRef>
+          <a:effectRef idx="1">
+            <a:schemeClr val="accent1"/>
+          </a:effectRef>
+          <a:fontRef idx="minor">
+            <a:schemeClr val="tx1"/>
+          </a:fontRef>
+        </p:style>
+      </p:cxnSp>
+      <p:sp>
+        <p:nvSpPr>
+          <p:cNvPr id="56" name="TextBox 55"/>
+          <p:cNvSpPr txBox="1"/>
+          <p:nvPr/>
+        </p:nvSpPr>
+        <p:spPr>
+          <a:xfrm>
+            <a:off x="6233508" y="2781651"/>
+            <a:ext cx="374822" cy="584776"/>
+          </a:xfrm>
+          <a:prstGeom prst="rect">
+            <a:avLst/>
+          </a:prstGeom>
+          <a:solidFill>
+            <a:srgbClr val="FFFF00"/>
+          </a:solidFill>
+        </p:spPr>
+        <p:txBody>
+          <a:bodyPr wrap="none" rtlCol="0">
+            <a:spAutoFit/>
+          </a:bodyPr>
+          <a:lstStyle/>
+          <a:p>
+            <a:r>
+              <a:rPr lang="en-US" sz="3200" b="1" dirty="0"/>
+              <a:t>?</a:t>
+            </a:r>
+            <a:endParaRPr lang="en-US" sz="3200" b="1" dirty="0"/>
+          </a:p>
+        </p:txBody>
+      </p:sp>
+    </p:spTree>
+    <p:extLst>
+      <p:ext uri="{BB962C8B-B14F-4D97-AF65-F5344CB8AC3E}">
+        <p14:creationId xmlns:p14="http://schemas.microsoft.com/office/powerpoint/2010/main" val="3765936298"/>
+      </p:ext>
+    </p:extLst>
+  </p:cSld>
+  <p:clrMapOvr>
+    <a:masterClrMapping/>
+  </p:clrMapOvr>
+  <p:timing>
+    <p:tnLst>
+      <p:par>
+        <p:cTn xmlns:p14="http://schemas.microsoft.com/office/powerpoint/2010/main" id="1" dur="indefinite" restart="never" nodeType="tmRoot"/>
+      </p:par>
+    </p:tnLst>
+  </p:timing>
+</p:sld>
+</file>
+
+<file path=ppt/slides/slide12.xml><?xml version="1.0" encoding="utf-8"?>
+<p:sld xmlns:a="http://schemas.openxmlformats.org/drawingml/2006/main" xmlns:r="http://schemas.openxmlformats.org/officeDocument/2006/relationships" xmlns:p="http://schemas.openxmlformats.org/presentationml/2006/main">
+  <p:cSld>
+    <p:spTree>
+      <p:nvGrpSpPr>
+        <p:cNvPr id="1" name=""/>
+        <p:cNvGrpSpPr/>
+        <p:nvPr/>
+      </p:nvGrpSpPr>
+      <p:grpSpPr>
+        <a:xfrm>
+          <a:off x="0" y="0"/>
+          <a:ext cx="0" cy="0"/>
+          <a:chOff x="0" y="0"/>
+          <a:chExt cx="0" cy="0"/>
+        </a:xfrm>
+      </p:grpSpPr>
+      <p:sp>
+        <p:nvSpPr>
+          <p:cNvPr id="2" name="Oval 1"/>
+          <p:cNvSpPr/>
+          <p:nvPr/>
+        </p:nvSpPr>
+        <p:spPr>
+          <a:xfrm>
+            <a:off x="1284347" y="2647823"/>
+            <a:ext cx="914400" cy="914400"/>
+          </a:xfrm>
+          <a:prstGeom prst="ellipse">
+            <a:avLst/>
+          </a:prstGeom>
+          <a:noFill/>
+          <a:ln w="57150" cmpd="sng"/>
+        </p:spPr>
+        <p:style>
+          <a:lnRef idx="1">
+            <a:schemeClr val="accent1"/>
+          </a:lnRef>
+          <a:fillRef idx="3">
+            <a:schemeClr val="accent1"/>
+          </a:fillRef>
+          <a:effectRef idx="2">
+            <a:schemeClr val="accent1"/>
+          </a:effectRef>
+          <a:fontRef idx="minor">
+            <a:schemeClr val="lt1"/>
+          </a:fontRef>
+        </p:style>
+        <p:txBody>
+          <a:bodyPr rtlCol="0" anchor="ctr"/>
+          <a:lstStyle/>
+          <a:p>
+            <a:pPr algn="ctr"/>
+            <a:r>
+              <a:rPr lang="en-US" sz="4800" b="1" dirty="0" smtClean="0">
+                <a:solidFill>
+                  <a:srgbClr val="FF0000"/>
+                </a:solidFill>
+              </a:rPr>
+              <a:t>A</a:t>
+            </a:r>
+            <a:endParaRPr lang="en-US" sz="4800" b="1" dirty="0">
+              <a:solidFill>
+                <a:srgbClr val="FF0000"/>
+              </a:solidFill>
+            </a:endParaRPr>
+          </a:p>
+        </p:txBody>
+      </p:sp>
+      <p:sp>
+        <p:nvSpPr>
+          <p:cNvPr id="4" name="Oval 3"/>
+          <p:cNvSpPr/>
+          <p:nvPr/>
+        </p:nvSpPr>
+        <p:spPr>
+          <a:xfrm>
+            <a:off x="3505539" y="1470033"/>
+            <a:ext cx="914400" cy="914400"/>
+          </a:xfrm>
+          <a:prstGeom prst="ellipse">
+            <a:avLst/>
+          </a:prstGeom>
+          <a:noFill/>
+          <a:ln w="57150" cmpd="sng"/>
+        </p:spPr>
+        <p:style>
+          <a:lnRef idx="1">
+            <a:schemeClr val="accent1"/>
+          </a:lnRef>
+          <a:fillRef idx="3">
+            <a:schemeClr val="accent1"/>
+          </a:fillRef>
+          <a:effectRef idx="2">
+            <a:schemeClr val="accent1"/>
+          </a:effectRef>
+          <a:fontRef idx="minor">
+            <a:schemeClr val="lt1"/>
+          </a:fontRef>
+        </p:style>
+        <p:txBody>
+          <a:bodyPr rtlCol="0" anchor="ctr"/>
+          <a:lstStyle/>
+          <a:p>
+            <a:pPr algn="ctr"/>
+            <a:r>
+              <a:rPr lang="en-US" sz="4800" b="1" dirty="0" smtClean="0">
+                <a:solidFill>
+                  <a:srgbClr val="FF0000"/>
+                </a:solidFill>
+              </a:rPr>
+              <a:t>B</a:t>
+            </a:r>
+            <a:endParaRPr lang="en-US" sz="4800" b="1" dirty="0">
+              <a:solidFill>
+                <a:srgbClr val="FF0000"/>
+              </a:solidFill>
+            </a:endParaRPr>
+          </a:p>
+        </p:txBody>
+      </p:sp>
+      <p:sp>
+        <p:nvSpPr>
+          <p:cNvPr id="5" name="Oval 4"/>
+          <p:cNvSpPr/>
+          <p:nvPr/>
+        </p:nvSpPr>
+        <p:spPr>
+          <a:xfrm>
+            <a:off x="3779232" y="3875870"/>
+            <a:ext cx="914400" cy="914400"/>
+          </a:xfrm>
+          <a:prstGeom prst="ellipse">
+            <a:avLst/>
+          </a:prstGeom>
+          <a:noFill/>
+          <a:ln w="57150" cmpd="sng"/>
+        </p:spPr>
+        <p:style>
+          <a:lnRef idx="1">
+            <a:schemeClr val="accent1"/>
+          </a:lnRef>
+          <a:fillRef idx="3">
+            <a:schemeClr val="accent1"/>
+          </a:fillRef>
+          <a:effectRef idx="2">
+            <a:schemeClr val="accent1"/>
+          </a:effectRef>
+          <a:fontRef idx="minor">
+            <a:schemeClr val="lt1"/>
+          </a:fontRef>
+        </p:style>
+        <p:txBody>
+          <a:bodyPr rtlCol="0" anchor="ctr"/>
+          <a:lstStyle/>
+          <a:p>
+            <a:pPr algn="ctr"/>
+            <a:r>
+              <a:rPr lang="en-US" sz="4800" b="1" dirty="0" smtClean="0">
+                <a:solidFill>
+                  <a:srgbClr val="FF0000"/>
+                </a:solidFill>
+              </a:rPr>
+              <a:t>C</a:t>
+            </a:r>
+            <a:endParaRPr lang="en-US" sz="4800" b="1" dirty="0">
+              <a:solidFill>
+                <a:srgbClr val="FF0000"/>
+              </a:solidFill>
+            </a:endParaRPr>
+          </a:p>
+        </p:txBody>
+      </p:sp>
+      <p:cxnSp>
+        <p:nvCxnSpPr>
+          <p:cNvPr id="7" name="Straight Arrow Connector 6"/>
+          <p:cNvCxnSpPr>
+            <a:stCxn id="2" idx="6"/>
+          </p:cNvCxnSpPr>
+          <p:nvPr/>
+        </p:nvCxnSpPr>
+        <p:spPr>
+          <a:xfrm flipV="1">
+            <a:off x="2198747" y="3093477"/>
+            <a:ext cx="6742206" cy="11546"/>
+          </a:xfrm>
+          <a:prstGeom prst="straightConnector1">
+            <a:avLst/>
+          </a:prstGeom>
+          <a:ln w="76200" cmpd="sng">
+            <a:solidFill>
+              <a:srgbClr val="FF0000"/>
+            </a:solidFill>
+            <a:headEnd type="oval"/>
+            <a:tailEnd type="triangle"/>
+          </a:ln>
+        </p:spPr>
+        <p:style>
+          <a:lnRef idx="2">
+            <a:schemeClr val="accent1"/>
+          </a:lnRef>
+          <a:fillRef idx="0">
+            <a:schemeClr val="accent1"/>
+          </a:fillRef>
+          <a:effectRef idx="1">
+            <a:schemeClr val="accent1"/>
+          </a:effectRef>
+          <a:fontRef idx="minor">
+            <a:schemeClr val="tx1"/>
+          </a:fontRef>
+        </p:style>
+      </p:cxnSp>
+      <p:cxnSp>
+        <p:nvCxnSpPr>
+          <p:cNvPr id="9" name="Straight Arrow Connector 8"/>
+          <p:cNvCxnSpPr>
+            <a:stCxn id="4" idx="6"/>
+          </p:cNvCxnSpPr>
+          <p:nvPr/>
+        </p:nvCxnSpPr>
+        <p:spPr>
+          <a:xfrm>
+            <a:off x="4419939" y="1927233"/>
+            <a:ext cx="4262243" cy="0"/>
+          </a:xfrm>
+          <a:prstGeom prst="straightConnector1">
+            <a:avLst/>
+          </a:prstGeom>
+          <a:ln w="76200" cmpd="sng">
+            <a:solidFill>
+              <a:srgbClr val="FF0000"/>
+            </a:solidFill>
+            <a:headEnd type="oval"/>
+            <a:tailEnd type="triangle"/>
+          </a:ln>
+        </p:spPr>
+        <p:style>
+          <a:lnRef idx="2">
+            <a:schemeClr val="accent1"/>
+          </a:lnRef>
+          <a:fillRef idx="0">
+            <a:schemeClr val="accent1"/>
+          </a:fillRef>
+          <a:effectRef idx="1">
+            <a:schemeClr val="accent1"/>
+          </a:effectRef>
+          <a:fontRef idx="minor">
+            <a:schemeClr val="tx1"/>
+          </a:fontRef>
+        </p:style>
+      </p:cxnSp>
+      <p:cxnSp>
+        <p:nvCxnSpPr>
+          <p:cNvPr id="11" name="Straight Arrow Connector 10"/>
+          <p:cNvCxnSpPr>
+            <a:endCxn id="4" idx="2"/>
+          </p:cNvCxnSpPr>
+          <p:nvPr/>
+        </p:nvCxnSpPr>
+        <p:spPr>
+          <a:xfrm>
+            <a:off x="184727" y="1927233"/>
+            <a:ext cx="3320812" cy="0"/>
+          </a:xfrm>
+          <a:prstGeom prst="straightConnector1">
+            <a:avLst/>
+          </a:prstGeom>
+          <a:ln w="76200" cmpd="sng">
+            <a:solidFill>
+              <a:srgbClr val="FF0000"/>
+            </a:solidFill>
+            <a:tailEnd type="arrow"/>
+          </a:ln>
+        </p:spPr>
+        <p:style>
+          <a:lnRef idx="2">
+            <a:schemeClr val="accent1"/>
+          </a:lnRef>
+          <a:fillRef idx="0">
+            <a:schemeClr val="accent1"/>
+          </a:fillRef>
+          <a:effectRef idx="1">
+            <a:schemeClr val="accent1"/>
+          </a:effectRef>
+          <a:fontRef idx="minor">
+            <a:schemeClr val="tx1"/>
+          </a:fontRef>
+        </p:style>
+      </p:cxnSp>
+      <p:cxnSp>
+        <p:nvCxnSpPr>
+          <p:cNvPr id="26" name="Straight Arrow Connector 25"/>
+          <p:cNvCxnSpPr>
+            <a:stCxn id="5" idx="6"/>
+          </p:cNvCxnSpPr>
+          <p:nvPr/>
+        </p:nvCxnSpPr>
+        <p:spPr>
+          <a:xfrm>
+            <a:off x="4693632" y="4333070"/>
+            <a:ext cx="4150377" cy="8946"/>
+          </a:xfrm>
+          <a:prstGeom prst="straightConnector1">
+            <a:avLst/>
+          </a:prstGeom>
+          <a:ln w="76200" cmpd="sng">
+            <a:solidFill>
+              <a:srgbClr val="FF0000"/>
+            </a:solidFill>
+            <a:headEnd type="oval"/>
+            <a:tailEnd type="triangle"/>
+          </a:ln>
+        </p:spPr>
+        <p:style>
+          <a:lnRef idx="2">
+            <a:schemeClr val="accent1"/>
+          </a:lnRef>
+          <a:fillRef idx="0">
+            <a:schemeClr val="accent1"/>
+          </a:fillRef>
+          <a:effectRef idx="1">
+            <a:schemeClr val="accent1"/>
+          </a:effectRef>
+          <a:fontRef idx="minor">
+            <a:schemeClr val="tx1"/>
+          </a:fontRef>
+        </p:style>
+      </p:cxnSp>
+      <p:cxnSp>
+        <p:nvCxnSpPr>
+          <p:cNvPr id="28" name="Straight Arrow Connector 27"/>
+          <p:cNvCxnSpPr>
+            <a:stCxn id="5" idx="2"/>
+          </p:cNvCxnSpPr>
+          <p:nvPr/>
+        </p:nvCxnSpPr>
+        <p:spPr>
+          <a:xfrm flipH="1">
+            <a:off x="307701" y="4333070"/>
+            <a:ext cx="3471531" cy="8946"/>
+          </a:xfrm>
+          <a:prstGeom prst="straightConnector1">
+            <a:avLst/>
+          </a:prstGeom>
+          <a:ln w="76200" cmpd="sng">
+            <a:solidFill>
+              <a:srgbClr val="FF0000"/>
+            </a:solidFill>
+            <a:headEnd type="arrow"/>
+            <a:tailEnd type="none"/>
+          </a:ln>
+        </p:spPr>
+        <p:style>
+          <a:lnRef idx="2">
+            <a:schemeClr val="accent1"/>
+          </a:lnRef>
+          <a:fillRef idx="0">
+            <a:schemeClr val="accent1"/>
+          </a:fillRef>
+          <a:effectRef idx="1">
+            <a:schemeClr val="accent1"/>
+          </a:effectRef>
+          <a:fontRef idx="minor">
+            <a:schemeClr val="tx1"/>
+          </a:fontRef>
+        </p:style>
+      </p:cxnSp>
+      <p:cxnSp>
+        <p:nvCxnSpPr>
+          <p:cNvPr id="31" name="Straight Arrow Connector 30"/>
+          <p:cNvCxnSpPr>
+            <a:stCxn id="2" idx="2"/>
+          </p:cNvCxnSpPr>
+          <p:nvPr/>
+        </p:nvCxnSpPr>
+        <p:spPr>
+          <a:xfrm flipH="1">
+            <a:off x="258771" y="3105023"/>
+            <a:ext cx="1025576" cy="0"/>
+          </a:xfrm>
+          <a:prstGeom prst="straightConnector1">
+            <a:avLst/>
+          </a:prstGeom>
+          <a:ln w="76200" cmpd="sng">
+            <a:solidFill>
+              <a:srgbClr val="FF0000"/>
+            </a:solidFill>
+            <a:headEnd type="arrow"/>
+            <a:tailEnd type="none"/>
+          </a:ln>
+        </p:spPr>
+        <p:style>
+          <a:lnRef idx="2">
+            <a:schemeClr val="accent1"/>
+          </a:lnRef>
+          <a:fillRef idx="0">
+            <a:schemeClr val="accent1"/>
+          </a:fillRef>
+          <a:effectRef idx="1">
+            <a:schemeClr val="accent1"/>
+          </a:effectRef>
+          <a:fontRef idx="minor">
+            <a:schemeClr val="tx1"/>
+          </a:fontRef>
+        </p:style>
+      </p:cxnSp>
+      <p:sp>
+        <p:nvSpPr>
+          <p:cNvPr id="38" name="Oval 37"/>
+          <p:cNvSpPr/>
+          <p:nvPr/>
+        </p:nvSpPr>
+        <p:spPr>
+          <a:xfrm>
+            <a:off x="6579657" y="4660961"/>
+            <a:ext cx="914400" cy="914400"/>
+          </a:xfrm>
+          <a:prstGeom prst="ellipse">
+            <a:avLst/>
+          </a:prstGeom>
+          <a:noFill/>
+          <a:ln w="57150" cmpd="sng"/>
+        </p:spPr>
+        <p:style>
+          <a:lnRef idx="1">
+            <a:schemeClr val="accent1"/>
+          </a:lnRef>
+          <a:fillRef idx="3">
+            <a:schemeClr val="accent1"/>
+          </a:fillRef>
+          <a:effectRef idx="2">
+            <a:schemeClr val="accent1"/>
+          </a:effectRef>
+          <a:fontRef idx="minor">
+            <a:schemeClr val="lt1"/>
+          </a:fontRef>
+        </p:style>
+        <p:txBody>
+          <a:bodyPr rtlCol="0" anchor="ctr"/>
+          <a:lstStyle/>
+          <a:p>
+            <a:pPr algn="ctr"/>
+            <a:r>
+              <a:rPr lang="en-US" sz="4800" b="1" dirty="0" smtClean="0">
+                <a:solidFill>
+                  <a:srgbClr val="FF0000"/>
+                </a:solidFill>
+              </a:rPr>
+              <a:t>E</a:t>
+            </a:r>
+            <a:endParaRPr lang="en-US" sz="4800" b="1" dirty="0">
+              <a:solidFill>
+                <a:srgbClr val="FF0000"/>
+              </a:solidFill>
+            </a:endParaRPr>
+          </a:p>
+        </p:txBody>
+      </p:sp>
+      <p:cxnSp>
+        <p:nvCxnSpPr>
+          <p:cNvPr id="55" name="Straight Arrow Connector 54"/>
+          <p:cNvCxnSpPr>
+            <a:stCxn id="38" idx="2"/>
+          </p:cNvCxnSpPr>
+          <p:nvPr/>
+        </p:nvCxnSpPr>
+        <p:spPr>
+          <a:xfrm flipH="1">
+            <a:off x="307700" y="5118161"/>
+            <a:ext cx="6271957" cy="0"/>
+          </a:xfrm>
+          <a:prstGeom prst="straightConnector1">
+            <a:avLst/>
+          </a:prstGeom>
+          <a:ln w="76200" cmpd="sng">
+            <a:solidFill>
+              <a:srgbClr val="FF0000"/>
+            </a:solidFill>
+            <a:headEnd type="arrow"/>
+            <a:tailEnd type="none"/>
+          </a:ln>
+        </p:spPr>
+        <p:style>
+          <a:lnRef idx="2">
+            <a:schemeClr val="accent1"/>
+          </a:lnRef>
+          <a:fillRef idx="0">
+            <a:schemeClr val="accent1"/>
+          </a:fillRef>
+          <a:effectRef idx="1">
+            <a:schemeClr val="accent1"/>
+          </a:effectRef>
+          <a:fontRef idx="minor">
+            <a:schemeClr val="tx1"/>
+          </a:fontRef>
+        </p:style>
+      </p:cxnSp>
+      <p:cxnSp>
+        <p:nvCxnSpPr>
+          <p:cNvPr id="63" name="Straight Arrow Connector 62"/>
+          <p:cNvCxnSpPr>
+            <a:stCxn id="38" idx="6"/>
+          </p:cNvCxnSpPr>
+          <p:nvPr/>
+        </p:nvCxnSpPr>
+        <p:spPr>
+          <a:xfrm>
+            <a:off x="7494057" y="5118161"/>
+            <a:ext cx="1349952" cy="0"/>
+          </a:xfrm>
+          <a:prstGeom prst="straightConnector1">
+            <a:avLst/>
+          </a:prstGeom>
+          <a:ln w="76200" cmpd="sng">
+            <a:solidFill>
+              <a:srgbClr val="FF0000"/>
+            </a:solidFill>
+            <a:headEnd type="oval"/>
+            <a:tailEnd type="triangle"/>
+          </a:ln>
+        </p:spPr>
+        <p:style>
+          <a:lnRef idx="2">
+            <a:schemeClr val="accent1"/>
+          </a:lnRef>
+          <a:fillRef idx="0">
+            <a:schemeClr val="accent1"/>
+          </a:fillRef>
+          <a:effectRef idx="1">
+            <a:schemeClr val="accent1"/>
+          </a:effectRef>
+          <a:fontRef idx="minor">
+            <a:schemeClr val="tx1"/>
+          </a:fontRef>
+        </p:style>
+      </p:cxnSp>
+      <p:cxnSp>
+        <p:nvCxnSpPr>
+          <p:cNvPr id="13" name="Straight Arrow Connector 12"/>
+          <p:cNvCxnSpPr>
+            <a:stCxn id="38" idx="0"/>
+            <a:endCxn id="39" idx="4"/>
+          </p:cNvCxnSpPr>
+          <p:nvPr/>
+        </p:nvCxnSpPr>
+        <p:spPr>
+          <a:xfrm flipV="1">
+            <a:off x="7036857" y="3486760"/>
+            <a:ext cx="811716" cy="1174201"/>
+          </a:xfrm>
+          <a:prstGeom prst="straightConnector1">
+            <a:avLst/>
+          </a:prstGeom>
+          <a:ln>
+            <a:tailEnd type="arrow"/>
+          </a:ln>
+        </p:spPr>
+        <p:style>
+          <a:lnRef idx="2">
+            <a:schemeClr val="accent1"/>
+          </a:lnRef>
+          <a:fillRef idx="0">
+            <a:schemeClr val="accent1"/>
+          </a:fillRef>
+          <a:effectRef idx="1">
+            <a:schemeClr val="accent1"/>
+          </a:effectRef>
+          <a:fontRef idx="minor">
+            <a:schemeClr val="tx1"/>
+          </a:fontRef>
+        </p:style>
+      </p:cxnSp>
+      <p:sp>
+        <p:nvSpPr>
+          <p:cNvPr id="39" name="Oval 38"/>
+          <p:cNvSpPr/>
+          <p:nvPr/>
+        </p:nvSpPr>
+        <p:spPr>
+          <a:xfrm>
+            <a:off x="7391373" y="2572360"/>
+            <a:ext cx="914400" cy="914400"/>
+          </a:xfrm>
+          <a:prstGeom prst="ellipse">
+            <a:avLst/>
+          </a:prstGeom>
+          <a:solidFill>
+            <a:schemeClr val="bg1"/>
+          </a:solidFill>
+          <a:ln w="57150" cmpd="sng"/>
+        </p:spPr>
+        <p:style>
+          <a:lnRef idx="1">
+            <a:schemeClr val="accent1"/>
+          </a:lnRef>
+          <a:fillRef idx="3">
+            <a:schemeClr val="accent1"/>
+          </a:fillRef>
+          <a:effectRef idx="2">
+            <a:schemeClr val="accent1"/>
+          </a:effectRef>
+          <a:fontRef idx="minor">
+            <a:schemeClr val="lt1"/>
+          </a:fontRef>
+        </p:style>
+        <p:txBody>
+          <a:bodyPr rtlCol="0" anchor="ctr"/>
+          <a:lstStyle/>
+          <a:p>
+            <a:pPr algn="ctr"/>
+            <a:r>
+              <a:rPr lang="en-US" sz="4800" b="1" dirty="0" smtClean="0">
+                <a:solidFill>
+                  <a:srgbClr val="FF0000"/>
+                </a:solidFill>
+              </a:rPr>
+              <a:t> </a:t>
+            </a:r>
+            <a:r>
+              <a:rPr lang="en-US" sz="4800" b="1" dirty="0" smtClean="0">
+                <a:solidFill>
+                  <a:srgbClr val="FF0000"/>
+                </a:solidFill>
+              </a:rPr>
+              <a:t>F</a:t>
+            </a:r>
+            <a:endParaRPr lang="en-US" sz="4800" b="1" dirty="0">
+              <a:solidFill>
+                <a:srgbClr val="FF0000"/>
+              </a:solidFill>
+            </a:endParaRPr>
+          </a:p>
+        </p:txBody>
+      </p:sp>
+      <p:sp>
+        <p:nvSpPr>
+          <p:cNvPr id="50" name="Oval 49"/>
+          <p:cNvSpPr/>
+          <p:nvPr/>
+        </p:nvSpPr>
+        <p:spPr>
+          <a:xfrm>
+            <a:off x="4840845" y="2661162"/>
+            <a:ext cx="914400" cy="914400"/>
+          </a:xfrm>
+          <a:prstGeom prst="ellipse">
+            <a:avLst/>
+          </a:prstGeom>
+          <a:solidFill>
+            <a:srgbClr val="FF0000"/>
+          </a:solidFill>
+          <a:ln w="57150" cmpd="sng"/>
+        </p:spPr>
+        <p:style>
+          <a:lnRef idx="1">
+            <a:schemeClr val="accent1"/>
+          </a:lnRef>
+          <a:fillRef idx="3">
+            <a:schemeClr val="accent1"/>
+          </a:fillRef>
+          <a:effectRef idx="2">
+            <a:schemeClr val="accent1"/>
+          </a:effectRef>
+          <a:fontRef idx="minor">
+            <a:schemeClr val="lt1"/>
+          </a:fontRef>
+        </p:style>
+        <p:txBody>
+          <a:bodyPr rtlCol="0" anchor="ctr"/>
+          <a:lstStyle/>
+          <a:p>
+            <a:pPr algn="ctr"/>
+            <a:r>
+              <a:rPr lang="en-US" sz="4800" b="1" dirty="0" smtClean="0">
+                <a:solidFill>
+                  <a:schemeClr val="bg1"/>
+                </a:solidFill>
+              </a:rPr>
+              <a:t>D</a:t>
+            </a:r>
+            <a:endParaRPr lang="en-US" sz="4800" b="1" dirty="0">
+              <a:solidFill>
+                <a:schemeClr val="bg1"/>
+              </a:solidFill>
+            </a:endParaRPr>
+          </a:p>
+        </p:txBody>
+      </p:sp>
+      <p:cxnSp>
+        <p:nvCxnSpPr>
+          <p:cNvPr id="19" name="Straight Arrow Connector 18"/>
+          <p:cNvCxnSpPr>
+            <a:stCxn id="4" idx="5"/>
+            <a:endCxn id="50" idx="1"/>
+          </p:cNvCxnSpPr>
+          <p:nvPr/>
+        </p:nvCxnSpPr>
+        <p:spPr>
+          <a:xfrm>
+            <a:off x="4286028" y="2250522"/>
+            <a:ext cx="688728" cy="544551"/>
+          </a:xfrm>
+          <a:prstGeom prst="straightConnector1">
+            <a:avLst/>
+          </a:prstGeom>
+          <a:ln>
+            <a:tailEnd type="arrow"/>
+          </a:ln>
+        </p:spPr>
+        <p:style>
+          <a:lnRef idx="2">
+            <a:schemeClr val="accent1"/>
+          </a:lnRef>
+          <a:fillRef idx="0">
+            <a:schemeClr val="accent1"/>
+          </a:fillRef>
+          <a:effectRef idx="1">
+            <a:schemeClr val="accent1"/>
+          </a:effectRef>
+          <a:fontRef idx="minor">
+            <a:schemeClr val="tx1"/>
+          </a:fontRef>
+        </p:style>
+      </p:cxnSp>
+      <p:cxnSp>
+        <p:nvCxnSpPr>
+          <p:cNvPr id="10" name="Straight Arrow Connector 9"/>
+          <p:cNvCxnSpPr>
+            <a:stCxn id="5" idx="7"/>
+          </p:cNvCxnSpPr>
+          <p:nvPr/>
+        </p:nvCxnSpPr>
+        <p:spPr>
+          <a:xfrm flipV="1">
+            <a:off x="4559721" y="3575562"/>
+            <a:ext cx="663959" cy="434219"/>
+          </a:xfrm>
+          <a:prstGeom prst="straightConnector1">
+            <a:avLst/>
+          </a:prstGeom>
+          <a:ln>
+            <a:tailEnd type="arrow"/>
+          </a:ln>
+        </p:spPr>
+        <p:style>
+          <a:lnRef idx="2">
+            <a:schemeClr val="accent1"/>
+          </a:lnRef>
+          <a:fillRef idx="0">
+            <a:schemeClr val="accent1"/>
+          </a:fillRef>
+          <a:effectRef idx="1">
+            <a:schemeClr val="accent1"/>
+          </a:effectRef>
+          <a:fontRef idx="minor">
+            <a:schemeClr val="tx1"/>
+          </a:fontRef>
+        </p:style>
+      </p:cxnSp>
+      <p:sp>
+        <p:nvSpPr>
+          <p:cNvPr id="16" name="TextBox 15"/>
+          <p:cNvSpPr txBox="1"/>
+          <p:nvPr/>
+        </p:nvSpPr>
+        <p:spPr>
+          <a:xfrm>
+            <a:off x="267269" y="941877"/>
+            <a:ext cx="574647" cy="1015663"/>
+          </a:xfrm>
+          <a:prstGeom prst="rect">
+            <a:avLst/>
+          </a:prstGeom>
+          <a:noFill/>
+        </p:spPr>
+        <p:txBody>
+          <a:bodyPr wrap="none" rtlCol="0">
+            <a:spAutoFit/>
+          </a:bodyPr>
+          <a:lstStyle/>
+          <a:p>
+            <a:r>
+              <a:rPr lang="en-US" sz="6000" b="1" dirty="0" smtClean="0"/>
+              <a:t>0</a:t>
+            </a:r>
+            <a:endParaRPr lang="en-US" sz="6000" b="1" dirty="0"/>
+          </a:p>
+        </p:txBody>
+      </p:sp>
+      <p:sp>
+        <p:nvSpPr>
+          <p:cNvPr id="40" name="TextBox 39"/>
+          <p:cNvSpPr txBox="1"/>
+          <p:nvPr/>
+        </p:nvSpPr>
+        <p:spPr>
+          <a:xfrm>
+            <a:off x="228836" y="2095094"/>
+            <a:ext cx="574647" cy="1015663"/>
+          </a:xfrm>
+          <a:prstGeom prst="rect">
+            <a:avLst/>
+          </a:prstGeom>
+          <a:noFill/>
+        </p:spPr>
+        <p:txBody>
+          <a:bodyPr wrap="none" rtlCol="0">
+            <a:spAutoFit/>
+          </a:bodyPr>
+          <a:lstStyle/>
+          <a:p>
+            <a:r>
+              <a:rPr lang="en-US" sz="6000" b="1" dirty="0"/>
+              <a:t>1</a:t>
+            </a:r>
+            <a:endParaRPr lang="en-US" sz="6000" b="1" dirty="0"/>
+          </a:p>
+        </p:txBody>
+      </p:sp>
+      <p:sp>
+        <p:nvSpPr>
+          <p:cNvPr id="43" name="TextBox 42"/>
+          <p:cNvSpPr txBox="1"/>
+          <p:nvPr/>
+        </p:nvSpPr>
+        <p:spPr>
+          <a:xfrm>
+            <a:off x="312268" y="3326353"/>
+            <a:ext cx="574647" cy="1015663"/>
+          </a:xfrm>
+          <a:prstGeom prst="rect">
+            <a:avLst/>
+          </a:prstGeom>
+          <a:noFill/>
+        </p:spPr>
+        <p:txBody>
+          <a:bodyPr wrap="none" rtlCol="0">
+            <a:spAutoFit/>
+          </a:bodyPr>
+          <a:lstStyle/>
+          <a:p>
+            <a:r>
+              <a:rPr lang="en-US" sz="6000" b="1" dirty="0" smtClean="0"/>
+              <a:t>2</a:t>
+            </a:r>
+            <a:endParaRPr lang="en-US" sz="6000" b="1" dirty="0"/>
+          </a:p>
+        </p:txBody>
+      </p:sp>
+      <p:sp>
+        <p:nvSpPr>
+          <p:cNvPr id="44" name="TextBox 43"/>
+          <p:cNvSpPr txBox="1"/>
+          <p:nvPr/>
+        </p:nvSpPr>
+        <p:spPr>
+          <a:xfrm>
+            <a:off x="312268" y="4228283"/>
+            <a:ext cx="574647" cy="1015663"/>
+          </a:xfrm>
+          <a:prstGeom prst="rect">
+            <a:avLst/>
+          </a:prstGeom>
+          <a:noFill/>
+        </p:spPr>
+        <p:txBody>
+          <a:bodyPr wrap="none" rtlCol="0">
+            <a:spAutoFit/>
+          </a:bodyPr>
+          <a:lstStyle/>
+          <a:p>
+            <a:r>
+              <a:rPr lang="en-US" sz="6000" b="1" dirty="0"/>
+              <a:t>3</a:t>
+            </a:r>
+            <a:endParaRPr lang="en-US" sz="6000" b="1" dirty="0"/>
+          </a:p>
+        </p:txBody>
+      </p:sp>
+      <p:sp>
+        <p:nvSpPr>
+          <p:cNvPr id="45" name="TextBox 44"/>
+          <p:cNvSpPr txBox="1"/>
+          <p:nvPr/>
+        </p:nvSpPr>
+        <p:spPr>
+          <a:xfrm>
+            <a:off x="4693632" y="2024166"/>
+            <a:ext cx="2086829" cy="584776"/>
+          </a:xfrm>
+          <a:prstGeom prst="rect">
+            <a:avLst/>
+          </a:prstGeom>
+          <a:solidFill>
+            <a:srgbClr val="FFFF00"/>
+          </a:solidFill>
+        </p:spPr>
+        <p:txBody>
+          <a:bodyPr wrap="none" rtlCol="0">
+            <a:spAutoFit/>
+          </a:bodyPr>
+          <a:lstStyle/>
+          <a:p>
+            <a:r>
+              <a:rPr lang="en-US" sz="3200" b="1" dirty="0" smtClean="0"/>
+              <a:t>[10, </a:t>
+            </a:r>
+            <a:r>
+              <a:rPr lang="en-US" sz="3200" b="1" dirty="0" smtClean="0"/>
+              <a:t>5</a:t>
+            </a:r>
+            <a:r>
+              <a:rPr lang="en-US" sz="3200" b="1" dirty="0" smtClean="0"/>
+              <a:t>, </a:t>
+            </a:r>
+            <a:r>
+              <a:rPr lang="en-US" sz="3200" b="1" dirty="0" smtClean="0"/>
+              <a:t>3</a:t>
+            </a:r>
+            <a:r>
+              <a:rPr lang="en-US" sz="3200" b="1" dirty="0" smtClean="0"/>
+              <a:t>, </a:t>
+            </a:r>
+            <a:r>
+              <a:rPr lang="en-US" sz="3200" b="1" dirty="0"/>
+              <a:t>2</a:t>
+            </a:r>
+            <a:r>
+              <a:rPr lang="en-US" sz="3200" b="1" dirty="0" smtClean="0"/>
+              <a:t>]</a:t>
+            </a:r>
+            <a:endParaRPr lang="en-US" sz="3200" b="1" dirty="0"/>
+          </a:p>
+        </p:txBody>
+      </p:sp>
+      <p:sp>
+        <p:nvSpPr>
+          <p:cNvPr id="46" name="TextBox 45"/>
+          <p:cNvSpPr txBox="1"/>
+          <p:nvPr/>
+        </p:nvSpPr>
+        <p:spPr>
+          <a:xfrm>
+            <a:off x="2839812" y="2450450"/>
+            <a:ext cx="1878840" cy="584776"/>
+          </a:xfrm>
+          <a:prstGeom prst="rect">
+            <a:avLst/>
+          </a:prstGeom>
+          <a:solidFill>
+            <a:srgbClr val="FFFF00"/>
+          </a:solidFill>
+        </p:spPr>
+        <p:txBody>
+          <a:bodyPr wrap="none" rtlCol="0">
+            <a:spAutoFit/>
+          </a:bodyPr>
+          <a:lstStyle/>
+          <a:p>
+            <a:r>
+              <a:rPr lang="en-US" sz="3200" b="1" dirty="0" smtClean="0"/>
+              <a:t>[3, </a:t>
+            </a:r>
+            <a:r>
+              <a:rPr lang="en-US" sz="3200" b="1" dirty="0" smtClean="0"/>
+              <a:t>8</a:t>
+            </a:r>
+            <a:r>
+              <a:rPr lang="en-US" sz="3200" b="1" dirty="0" smtClean="0"/>
+              <a:t>, </a:t>
+            </a:r>
+            <a:r>
+              <a:rPr lang="en-US" sz="3200" b="1" dirty="0"/>
+              <a:t>2</a:t>
+            </a:r>
+            <a:r>
+              <a:rPr lang="en-US" sz="3200" b="1" dirty="0" smtClean="0"/>
+              <a:t>, </a:t>
+            </a:r>
+            <a:r>
+              <a:rPr lang="en-US" sz="3200" b="1" dirty="0"/>
+              <a:t>1</a:t>
+            </a:r>
+            <a:r>
+              <a:rPr lang="en-US" sz="3200" b="1" dirty="0" smtClean="0"/>
+              <a:t>]</a:t>
+            </a:r>
+            <a:endParaRPr lang="en-US" sz="3200" b="1" dirty="0"/>
+          </a:p>
+        </p:txBody>
+      </p:sp>
+      <p:sp>
+        <p:nvSpPr>
+          <p:cNvPr id="47" name="TextBox 46"/>
+          <p:cNvSpPr txBox="1"/>
+          <p:nvPr/>
+        </p:nvSpPr>
+        <p:spPr>
+          <a:xfrm>
+            <a:off x="4974756" y="3562223"/>
+            <a:ext cx="1878840" cy="584776"/>
+          </a:xfrm>
+          <a:prstGeom prst="rect">
+            <a:avLst/>
+          </a:prstGeom>
+          <a:solidFill>
+            <a:srgbClr val="FFFF00"/>
+          </a:solidFill>
+        </p:spPr>
+        <p:txBody>
+          <a:bodyPr wrap="none" rtlCol="0">
+            <a:spAutoFit/>
+          </a:bodyPr>
+          <a:lstStyle/>
+          <a:p>
+            <a:r>
+              <a:rPr lang="en-US" sz="3200" b="1" dirty="0" smtClean="0"/>
+              <a:t>[6, </a:t>
+            </a:r>
+            <a:r>
+              <a:rPr lang="en-US" sz="3200" b="1" dirty="0"/>
+              <a:t>3</a:t>
+            </a:r>
+            <a:r>
+              <a:rPr lang="en-US" sz="3200" b="1" dirty="0" smtClean="0"/>
+              <a:t>, </a:t>
+            </a:r>
+            <a:r>
+              <a:rPr lang="en-US" sz="3200" b="1" dirty="0" smtClean="0"/>
+              <a:t>4</a:t>
+            </a:r>
+            <a:r>
+              <a:rPr lang="en-US" sz="3200" b="1" dirty="0" smtClean="0"/>
+              <a:t>, </a:t>
+            </a:r>
+            <a:r>
+              <a:rPr lang="en-US" sz="3200" b="1" dirty="0"/>
+              <a:t>1</a:t>
+            </a:r>
+            <a:r>
+              <a:rPr lang="en-US" sz="3200" b="1" dirty="0" smtClean="0"/>
+              <a:t>]</a:t>
+            </a:r>
+            <a:endParaRPr lang="en-US" sz="3200" b="1" dirty="0"/>
+          </a:p>
+        </p:txBody>
+      </p:sp>
+      <p:sp>
+        <p:nvSpPr>
+          <p:cNvPr id="56" name="TextBox 55"/>
+          <p:cNvSpPr txBox="1"/>
+          <p:nvPr/>
+        </p:nvSpPr>
+        <p:spPr>
+          <a:xfrm>
+            <a:off x="6233508" y="2781651"/>
+            <a:ext cx="374822" cy="584776"/>
+          </a:xfrm>
+          <a:prstGeom prst="rect">
+            <a:avLst/>
+          </a:prstGeom>
+          <a:solidFill>
+            <a:srgbClr val="FFFF00"/>
+          </a:solidFill>
+        </p:spPr>
+        <p:txBody>
+          <a:bodyPr wrap="none" rtlCol="0">
+            <a:spAutoFit/>
+          </a:bodyPr>
+          <a:lstStyle/>
+          <a:p>
+            <a:r>
+              <a:rPr lang="en-US" sz="3200" b="1" dirty="0"/>
+              <a:t>?</a:t>
+            </a:r>
+            <a:endParaRPr lang="en-US" sz="3200" b="1" dirty="0"/>
+          </a:p>
+        </p:txBody>
+      </p:sp>
+      <p:sp>
+        <p:nvSpPr>
+          <p:cNvPr id="32" name="TextBox 31"/>
+          <p:cNvSpPr txBox="1"/>
+          <p:nvPr/>
+        </p:nvSpPr>
+        <p:spPr>
+          <a:xfrm>
+            <a:off x="0" y="5673201"/>
+            <a:ext cx="9145051" cy="1077218"/>
+          </a:xfrm>
+          <a:prstGeom prst="rect">
+            <a:avLst/>
+          </a:prstGeom>
+          <a:solidFill>
+            <a:srgbClr val="FFFF00"/>
+          </a:solidFill>
+        </p:spPr>
+        <p:txBody>
+          <a:bodyPr wrap="none" rtlCol="0">
+            <a:spAutoFit/>
+          </a:bodyPr>
+          <a:lstStyle/>
+          <a:p>
+            <a:pPr algn="ctr"/>
+            <a:r>
+              <a:rPr lang="en-US" sz="3200" b="1" dirty="0"/>
+              <a:t>m</a:t>
+            </a:r>
+            <a:r>
+              <a:rPr lang="en-US" sz="3200" b="1" dirty="0" smtClean="0"/>
+              <a:t>ax([10, 5, 3, 2], [3, 8, 2, 1], [6, </a:t>
+            </a:r>
+            <a:r>
+              <a:rPr lang="en-US" sz="3200" b="1" dirty="0"/>
+              <a:t>3</a:t>
+            </a:r>
+            <a:r>
+              <a:rPr lang="en-US" sz="3200" b="1" dirty="0" smtClean="0"/>
+              <a:t>, </a:t>
+            </a:r>
+            <a:r>
+              <a:rPr lang="en-US" sz="3200" b="1" dirty="0" smtClean="0"/>
+              <a:t>4</a:t>
+            </a:r>
+            <a:r>
+              <a:rPr lang="en-US" sz="3200" b="1" dirty="0" smtClean="0"/>
+              <a:t>, </a:t>
+            </a:r>
+            <a:r>
+              <a:rPr lang="en-US" sz="3200" b="1" dirty="0"/>
+              <a:t>1</a:t>
+            </a:r>
+            <a:r>
+              <a:rPr lang="en-US" sz="3200" b="1" dirty="0" smtClean="0"/>
+              <a:t>]) = [10, 8, 4, 2]</a:t>
+            </a:r>
+          </a:p>
+          <a:p>
+            <a:pPr algn="ctr"/>
+            <a:r>
+              <a:rPr lang="en-US" sz="3200" b="1" dirty="0" smtClean="0"/>
+              <a:t>?= [10, 8, 4, 2] + [0, 1, 0, 0] = [10, 9, 4, 2]</a:t>
+            </a:r>
+            <a:r>
+              <a:rPr lang="en-US" sz="3200" b="1" dirty="0" smtClean="0"/>
+              <a:t>   </a:t>
+            </a:r>
+            <a:endParaRPr lang="en-US" sz="3200" b="1" dirty="0"/>
+          </a:p>
+        </p:txBody>
+      </p:sp>
+    </p:spTree>
+    <p:extLst>
+      <p:ext uri="{BB962C8B-B14F-4D97-AF65-F5344CB8AC3E}">
+        <p14:creationId xmlns:p14="http://schemas.microsoft.com/office/powerpoint/2010/main" val="1503734572"/>
+      </p:ext>
+    </p:extLst>
+  </p:cSld>
+  <p:clrMapOvr>
+    <a:masterClrMapping/>
+  </p:clrMapOvr>
+  <p:timing>
+    <p:tnLst>
+      <p:par>
+        <p:cTn xmlns:p14="http://schemas.microsoft.com/office/powerpoint/2010/main" id="1" dur="indefinite" restart="never" nodeType="tmRoot"/>
+      </p:par>
+    </p:tnLst>
+  </p:timing>
+</p:sld>
+</file>
+
+<file path=ppt/slides/slide13.xml><?xml version="1.0" encoding="utf-8"?>
+<p:sld xmlns:a="http://schemas.openxmlformats.org/drawingml/2006/main" xmlns:r="http://schemas.openxmlformats.org/officeDocument/2006/relationships" xmlns:p="http://schemas.openxmlformats.org/presentationml/2006/main">
+  <p:cSld>
+    <p:spTree>
+      <p:nvGrpSpPr>
+        <p:cNvPr id="1" name=""/>
+        <p:cNvGrpSpPr/>
+        <p:nvPr/>
+      </p:nvGrpSpPr>
+      <p:grpSpPr>
+        <a:xfrm>
+          <a:off x="0" y="0"/>
+          <a:ext cx="0" cy="0"/>
+          <a:chOff x="0" y="0"/>
+          <a:chExt cx="0" cy="0"/>
+        </a:xfrm>
+      </p:grpSpPr>
+      <p:cxnSp>
+        <p:nvCxnSpPr>
+          <p:cNvPr id="2" name="Straight Arrow Connector 1"/>
+          <p:cNvCxnSpPr/>
+          <p:nvPr/>
+        </p:nvCxnSpPr>
+        <p:spPr>
+          <a:xfrm>
+            <a:off x="184727" y="1110673"/>
+            <a:ext cx="8490350" cy="0"/>
+          </a:xfrm>
+          <a:prstGeom prst="straightConnector1">
+            <a:avLst/>
+          </a:prstGeom>
+          <a:ln w="76200" cmpd="sng">
+            <a:solidFill>
+              <a:srgbClr val="FF0000"/>
+            </a:solidFill>
+            <a:tailEnd type="arrow"/>
+          </a:ln>
+        </p:spPr>
+        <p:style>
+          <a:lnRef idx="2">
+            <a:schemeClr val="accent1"/>
+          </a:lnRef>
+          <a:fillRef idx="0">
+            <a:schemeClr val="accent1"/>
+          </a:fillRef>
+          <a:effectRef idx="1">
+            <a:schemeClr val="accent1"/>
+          </a:effectRef>
+          <a:fontRef idx="minor">
+            <a:schemeClr val="tx1"/>
+          </a:fontRef>
+        </p:style>
+      </p:cxnSp>
+      <p:cxnSp>
+        <p:nvCxnSpPr>
+          <p:cNvPr id="3" name="Straight Arrow Connector 2"/>
+          <p:cNvCxnSpPr/>
+          <p:nvPr/>
+        </p:nvCxnSpPr>
+        <p:spPr>
+          <a:xfrm>
+            <a:off x="184727" y="1725069"/>
+            <a:ext cx="8490350" cy="0"/>
+          </a:xfrm>
+          <a:prstGeom prst="straightConnector1">
+            <a:avLst/>
+          </a:prstGeom>
+          <a:ln w="76200" cmpd="sng">
+            <a:solidFill>
+              <a:srgbClr val="FF0000"/>
+            </a:solidFill>
+            <a:tailEnd type="arrow"/>
+          </a:ln>
+        </p:spPr>
+        <p:style>
+          <a:lnRef idx="2">
+            <a:schemeClr val="accent1"/>
+          </a:lnRef>
+          <a:fillRef idx="0">
+            <a:schemeClr val="accent1"/>
+          </a:fillRef>
+          <a:effectRef idx="1">
+            <a:schemeClr val="accent1"/>
+          </a:effectRef>
+          <a:fontRef idx="minor">
+            <a:schemeClr val="tx1"/>
+          </a:fontRef>
+        </p:style>
+      </p:cxnSp>
+      <p:cxnSp>
+        <p:nvCxnSpPr>
+          <p:cNvPr id="4" name="Straight Arrow Connector 3"/>
+          <p:cNvCxnSpPr/>
+          <p:nvPr/>
+        </p:nvCxnSpPr>
+        <p:spPr>
+          <a:xfrm>
+            <a:off x="184727" y="2177474"/>
+            <a:ext cx="8490350" cy="0"/>
+          </a:xfrm>
+          <a:prstGeom prst="straightConnector1">
+            <a:avLst/>
+          </a:prstGeom>
+          <a:ln w="76200" cmpd="sng">
+            <a:solidFill>
+              <a:srgbClr val="FF0000"/>
+            </a:solidFill>
+            <a:tailEnd type="arrow"/>
+          </a:ln>
+        </p:spPr>
+        <p:style>
+          <a:lnRef idx="2">
+            <a:schemeClr val="accent1"/>
+          </a:lnRef>
+          <a:fillRef idx="0">
+            <a:schemeClr val="accent1"/>
+          </a:fillRef>
+          <a:effectRef idx="1">
+            <a:schemeClr val="accent1"/>
+          </a:effectRef>
+          <a:fontRef idx="minor">
+            <a:schemeClr val="tx1"/>
+          </a:fontRef>
+        </p:style>
+      </p:cxnSp>
+      <p:cxnSp>
+        <p:nvCxnSpPr>
+          <p:cNvPr id="5" name="Straight Arrow Connector 4"/>
+          <p:cNvCxnSpPr/>
+          <p:nvPr/>
+        </p:nvCxnSpPr>
+        <p:spPr>
+          <a:xfrm>
+            <a:off x="184727" y="2779257"/>
+            <a:ext cx="8490350" cy="0"/>
+          </a:xfrm>
+          <a:prstGeom prst="straightConnector1">
+            <a:avLst/>
+          </a:prstGeom>
+          <a:ln w="76200" cmpd="sng">
+            <a:solidFill>
+              <a:srgbClr val="FF0000"/>
+            </a:solidFill>
+            <a:tailEnd type="arrow"/>
+          </a:ln>
+        </p:spPr>
+        <p:style>
+          <a:lnRef idx="2">
+            <a:schemeClr val="accent1"/>
+          </a:lnRef>
+          <a:fillRef idx="0">
+            <a:schemeClr val="accent1"/>
+          </a:fillRef>
+          <a:effectRef idx="1">
+            <a:schemeClr val="accent1"/>
+          </a:effectRef>
+          <a:fontRef idx="minor">
+            <a:schemeClr val="tx1"/>
+          </a:fontRef>
+        </p:style>
+      </p:cxnSp>
+      <p:sp>
+        <p:nvSpPr>
+          <p:cNvPr id="6" name="TextBox 5"/>
+          <p:cNvSpPr txBox="1"/>
+          <p:nvPr/>
+        </p:nvSpPr>
+        <p:spPr>
+          <a:xfrm>
+            <a:off x="8557524" y="1159748"/>
+            <a:ext cx="418654" cy="646331"/>
+          </a:xfrm>
+          <a:prstGeom prst="rect">
+            <a:avLst/>
+          </a:prstGeom>
+          <a:noFill/>
+        </p:spPr>
+        <p:txBody>
+          <a:bodyPr wrap="none" rtlCol="0">
+            <a:spAutoFit/>
+          </a:bodyPr>
+          <a:lstStyle/>
+          <a:p>
+            <a:r>
+              <a:rPr lang="en-US" sz="3600" b="1" dirty="0" smtClean="0"/>
+              <a:t>1</a:t>
+            </a:r>
+            <a:endParaRPr lang="en-US" sz="3600" b="1" dirty="0"/>
+          </a:p>
+        </p:txBody>
+      </p:sp>
+      <p:sp>
+        <p:nvSpPr>
+          <p:cNvPr id="7" name="Oval 6"/>
+          <p:cNvSpPr/>
+          <p:nvPr/>
+        </p:nvSpPr>
+        <p:spPr>
+          <a:xfrm>
+            <a:off x="762001" y="722923"/>
+            <a:ext cx="762000" cy="1302150"/>
+          </a:xfrm>
+          <a:prstGeom prst="ellipse">
+            <a:avLst/>
+          </a:prstGeom>
+        </p:spPr>
+        <p:style>
+          <a:lnRef idx="1">
+            <a:schemeClr val="accent1"/>
+          </a:lnRef>
+          <a:fillRef idx="3">
+            <a:schemeClr val="accent1"/>
+          </a:fillRef>
+          <a:effectRef idx="2">
+            <a:schemeClr val="accent1"/>
+          </a:effectRef>
+          <a:fontRef idx="minor">
+            <a:schemeClr val="lt1"/>
+          </a:fontRef>
+        </p:style>
+        <p:txBody>
+          <a:bodyPr rtlCol="0" anchor="ctr"/>
+          <a:lstStyle/>
+          <a:p>
+            <a:pPr algn="ctr"/>
+            <a:r>
+              <a:rPr lang="en-US" sz="6000" dirty="0"/>
+              <a:t>A</a:t>
+            </a:r>
+            <a:endParaRPr lang="en-US" sz="6000" dirty="0"/>
+          </a:p>
+        </p:txBody>
+      </p:sp>
+      <p:sp>
+        <p:nvSpPr>
+          <p:cNvPr id="8" name="Oval 7"/>
+          <p:cNvSpPr/>
+          <p:nvPr/>
+        </p:nvSpPr>
+        <p:spPr>
+          <a:xfrm>
+            <a:off x="5205047" y="1373998"/>
+            <a:ext cx="762000" cy="1302150"/>
+          </a:xfrm>
+          <a:prstGeom prst="ellipse">
+            <a:avLst/>
+          </a:prstGeom>
+        </p:spPr>
+        <p:style>
+          <a:lnRef idx="1">
+            <a:schemeClr val="accent1"/>
+          </a:lnRef>
+          <a:fillRef idx="3">
+            <a:schemeClr val="accent1"/>
+          </a:fillRef>
+          <a:effectRef idx="2">
+            <a:schemeClr val="accent1"/>
+          </a:effectRef>
+          <a:fontRef idx="minor">
+            <a:schemeClr val="lt1"/>
+          </a:fontRef>
+        </p:style>
+        <p:txBody>
+          <a:bodyPr rtlCol="0" anchor="ctr"/>
+          <a:lstStyle/>
+          <a:p>
+            <a:pPr algn="ctr"/>
+            <a:r>
+              <a:rPr lang="en-US" sz="6000" dirty="0"/>
+              <a:t>C</a:t>
+            </a:r>
+            <a:endParaRPr lang="en-US" sz="6000" dirty="0"/>
+          </a:p>
+        </p:txBody>
+      </p:sp>
+      <p:sp>
+        <p:nvSpPr>
+          <p:cNvPr id="9" name="TextBox 8"/>
+          <p:cNvSpPr txBox="1"/>
+          <p:nvPr/>
+        </p:nvSpPr>
+        <p:spPr>
+          <a:xfrm>
+            <a:off x="8557524" y="1830250"/>
+            <a:ext cx="418654" cy="646331"/>
+          </a:xfrm>
+          <a:prstGeom prst="rect">
+            <a:avLst/>
+          </a:prstGeom>
+          <a:noFill/>
+        </p:spPr>
+        <p:txBody>
+          <a:bodyPr wrap="none" rtlCol="0">
+            <a:spAutoFit/>
+          </a:bodyPr>
+          <a:lstStyle/>
+          <a:p>
+            <a:r>
+              <a:rPr lang="en-US" sz="3600" b="1" dirty="0"/>
+              <a:t>2</a:t>
+            </a:r>
+          </a:p>
+        </p:txBody>
+      </p:sp>
+      <p:sp>
+        <p:nvSpPr>
+          <p:cNvPr id="10" name="TextBox 9"/>
+          <p:cNvSpPr txBox="1"/>
+          <p:nvPr/>
+        </p:nvSpPr>
+        <p:spPr>
+          <a:xfrm>
+            <a:off x="8588463" y="2476581"/>
+            <a:ext cx="418654" cy="646331"/>
+          </a:xfrm>
+          <a:prstGeom prst="rect">
+            <a:avLst/>
+          </a:prstGeom>
+          <a:noFill/>
+        </p:spPr>
+        <p:txBody>
+          <a:bodyPr wrap="none" rtlCol="0">
+            <a:spAutoFit/>
+          </a:bodyPr>
+          <a:lstStyle/>
+          <a:p>
+            <a:r>
+              <a:rPr lang="en-US" sz="3600" b="1" dirty="0" smtClean="0"/>
+              <a:t>3</a:t>
+            </a:r>
+            <a:endParaRPr lang="en-US" sz="3600" b="1" dirty="0"/>
+          </a:p>
+        </p:txBody>
+      </p:sp>
+      <p:sp>
+        <p:nvSpPr>
+          <p:cNvPr id="20" name="Oval 19"/>
+          <p:cNvSpPr/>
+          <p:nvPr/>
+        </p:nvSpPr>
+        <p:spPr>
+          <a:xfrm>
+            <a:off x="1695939" y="2025073"/>
+            <a:ext cx="762000" cy="1302150"/>
+          </a:xfrm>
+          <a:prstGeom prst="ellipse">
+            <a:avLst/>
+          </a:prstGeom>
+        </p:spPr>
+        <p:style>
+          <a:lnRef idx="1">
+            <a:schemeClr val="accent1"/>
+          </a:lnRef>
+          <a:fillRef idx="3">
+            <a:schemeClr val="accent1"/>
+          </a:fillRef>
+          <a:effectRef idx="2">
+            <a:schemeClr val="accent1"/>
+          </a:effectRef>
+          <a:fontRef idx="minor">
+            <a:schemeClr val="lt1"/>
+          </a:fontRef>
+        </p:style>
+        <p:txBody>
+          <a:bodyPr rtlCol="0" anchor="ctr"/>
+          <a:lstStyle/>
+          <a:p>
+            <a:pPr algn="ctr"/>
+            <a:r>
+              <a:rPr lang="en-US" sz="6000" dirty="0"/>
+              <a:t>B</a:t>
+            </a:r>
+            <a:endParaRPr lang="en-US" sz="6000" dirty="0"/>
+          </a:p>
+        </p:txBody>
+      </p:sp>
+      <p:sp>
+        <p:nvSpPr>
+          <p:cNvPr id="21" name="TextBox 20"/>
+          <p:cNvSpPr txBox="1"/>
+          <p:nvPr/>
+        </p:nvSpPr>
+        <p:spPr>
+          <a:xfrm>
+            <a:off x="8557524" y="399757"/>
+            <a:ext cx="418654" cy="646331"/>
+          </a:xfrm>
+          <a:prstGeom prst="rect">
+            <a:avLst/>
+          </a:prstGeom>
+          <a:noFill/>
+        </p:spPr>
+        <p:txBody>
+          <a:bodyPr wrap="none" rtlCol="0">
+            <a:spAutoFit/>
+          </a:bodyPr>
+          <a:lstStyle/>
+          <a:p>
+            <a:r>
+              <a:rPr lang="en-US" sz="3600" b="1" dirty="0"/>
+              <a:t>0</a:t>
+            </a:r>
+            <a:endParaRPr lang="en-US" sz="3600" b="1" dirty="0"/>
+          </a:p>
+        </p:txBody>
+      </p:sp>
+      <p:sp>
+        <p:nvSpPr>
+          <p:cNvPr id="22" name="TextBox 21"/>
+          <p:cNvSpPr txBox="1"/>
+          <p:nvPr/>
+        </p:nvSpPr>
+        <p:spPr>
+          <a:xfrm>
+            <a:off x="1695939" y="1204914"/>
+            <a:ext cx="1878840" cy="584776"/>
+          </a:xfrm>
+          <a:prstGeom prst="rect">
+            <a:avLst/>
+          </a:prstGeom>
+          <a:solidFill>
+            <a:srgbClr val="FFFF00"/>
+          </a:solidFill>
+        </p:spPr>
+        <p:txBody>
+          <a:bodyPr wrap="none" rtlCol="0">
+            <a:spAutoFit/>
+          </a:bodyPr>
+          <a:lstStyle/>
+          <a:p>
+            <a:r>
+              <a:rPr lang="en-US" sz="3200" b="1" dirty="0" smtClean="0"/>
+              <a:t>[3, </a:t>
+            </a:r>
+            <a:r>
+              <a:rPr lang="en-US" sz="3200" b="1" dirty="0" smtClean="0"/>
+              <a:t>8</a:t>
+            </a:r>
+            <a:r>
+              <a:rPr lang="en-US" sz="3200" b="1" dirty="0" smtClean="0"/>
+              <a:t>, </a:t>
+            </a:r>
+            <a:r>
+              <a:rPr lang="en-US" sz="3200" b="1" dirty="0"/>
+              <a:t>2</a:t>
+            </a:r>
+            <a:r>
+              <a:rPr lang="en-US" sz="3200" b="1" dirty="0" smtClean="0"/>
+              <a:t>, </a:t>
+            </a:r>
+            <a:r>
+              <a:rPr lang="en-US" sz="3200" b="1" dirty="0"/>
+              <a:t>1</a:t>
+            </a:r>
+            <a:r>
+              <a:rPr lang="en-US" sz="3200" b="1" dirty="0" smtClean="0"/>
+              <a:t>]</a:t>
+            </a:r>
+            <a:endParaRPr lang="en-US" sz="3200" b="1" dirty="0"/>
+          </a:p>
+        </p:txBody>
+      </p:sp>
+      <p:sp>
+        <p:nvSpPr>
+          <p:cNvPr id="23" name="TextBox 22"/>
+          <p:cNvSpPr txBox="1"/>
+          <p:nvPr/>
+        </p:nvSpPr>
+        <p:spPr>
+          <a:xfrm>
+            <a:off x="3326207" y="2065415"/>
+            <a:ext cx="1878840" cy="584776"/>
+          </a:xfrm>
+          <a:prstGeom prst="rect">
+            <a:avLst/>
+          </a:prstGeom>
+          <a:solidFill>
+            <a:srgbClr val="FFFF00"/>
+          </a:solidFill>
+        </p:spPr>
+        <p:txBody>
+          <a:bodyPr wrap="none" rtlCol="0">
+            <a:spAutoFit/>
+          </a:bodyPr>
+          <a:lstStyle/>
+          <a:p>
+            <a:r>
+              <a:rPr lang="en-US" sz="3200" b="1" dirty="0" smtClean="0"/>
+              <a:t>[1, </a:t>
+            </a:r>
+            <a:r>
+              <a:rPr lang="en-US" sz="3200" b="1" dirty="0"/>
+              <a:t>5</a:t>
+            </a:r>
+            <a:r>
+              <a:rPr lang="en-US" sz="3200" b="1" dirty="0" smtClean="0"/>
+              <a:t>, </a:t>
+            </a:r>
+            <a:r>
+              <a:rPr lang="en-US" sz="3200" b="1" dirty="0" smtClean="0"/>
+              <a:t>6</a:t>
+            </a:r>
+            <a:r>
+              <a:rPr lang="en-US" sz="3200" b="1" dirty="0"/>
+              <a:t>, </a:t>
+            </a:r>
+            <a:r>
+              <a:rPr lang="en-US" sz="3200" b="1" dirty="0" smtClean="0"/>
+              <a:t>2</a:t>
+            </a:r>
+            <a:r>
+              <a:rPr lang="en-US" sz="3200" b="1" dirty="0" smtClean="0"/>
+              <a:t>]</a:t>
+            </a:r>
+            <a:endParaRPr lang="en-US" sz="3200" b="1" dirty="0"/>
+          </a:p>
+        </p:txBody>
+      </p:sp>
+      <p:sp>
+        <p:nvSpPr>
+          <p:cNvPr id="24" name="TextBox 23"/>
+          <p:cNvSpPr txBox="1"/>
+          <p:nvPr/>
+        </p:nvSpPr>
+        <p:spPr>
+          <a:xfrm>
+            <a:off x="577636" y="3441083"/>
+            <a:ext cx="6929101" cy="1077218"/>
+          </a:xfrm>
+          <a:prstGeom prst="rect">
+            <a:avLst/>
+          </a:prstGeom>
+          <a:solidFill>
+            <a:srgbClr val="FFFF00"/>
+          </a:solidFill>
+        </p:spPr>
+        <p:txBody>
+          <a:bodyPr wrap="none" rtlCol="0">
+            <a:spAutoFit/>
+          </a:bodyPr>
+          <a:lstStyle/>
+          <a:p>
+            <a:pPr algn="ctr"/>
+            <a:r>
+              <a:rPr lang="en-US" sz="3200" b="1" dirty="0"/>
+              <a:t>m</a:t>
+            </a:r>
+            <a:r>
+              <a:rPr lang="en-US" sz="3200" b="1" dirty="0" smtClean="0"/>
+              <a:t>ax ([3, 8, 2, 1], </a:t>
+            </a:r>
+            <a:r>
+              <a:rPr lang="en-US" sz="3200" b="1" dirty="0" smtClean="0"/>
+              <a:t>[1, </a:t>
+            </a:r>
+            <a:r>
+              <a:rPr lang="en-US" sz="3200" b="1" dirty="0"/>
+              <a:t>5</a:t>
+            </a:r>
+            <a:r>
+              <a:rPr lang="en-US" sz="3200" b="1" dirty="0" smtClean="0"/>
+              <a:t>, </a:t>
+            </a:r>
+            <a:r>
+              <a:rPr lang="en-US" sz="3200" b="1" dirty="0" smtClean="0"/>
+              <a:t>6</a:t>
+            </a:r>
+            <a:r>
+              <a:rPr lang="en-US" sz="3200" b="1" dirty="0"/>
+              <a:t>, </a:t>
+            </a:r>
+            <a:r>
+              <a:rPr lang="en-US" sz="3200" b="1" dirty="0" smtClean="0"/>
+              <a:t>2</a:t>
+            </a:r>
+            <a:r>
+              <a:rPr lang="en-US" sz="3200" b="1" dirty="0" smtClean="0"/>
+              <a:t>]) = [3, 8, 6, 2]</a:t>
+            </a:r>
+          </a:p>
+          <a:p>
+            <a:pPr algn="ctr"/>
+            <a:r>
+              <a:rPr lang="en-US" sz="3200" b="1" dirty="0" smtClean="0"/>
+              <a:t>? = [3, 8, 6, 2] + [0, 1, 1, 0] = [3, 9, 7, 2]</a:t>
+            </a:r>
+            <a:endParaRPr lang="en-US" sz="3200" b="1" dirty="0"/>
+          </a:p>
+        </p:txBody>
+      </p:sp>
+      <p:sp>
+        <p:nvSpPr>
+          <p:cNvPr id="25" name="TextBox 24"/>
+          <p:cNvSpPr txBox="1"/>
+          <p:nvPr/>
+        </p:nvSpPr>
+        <p:spPr>
+          <a:xfrm>
+            <a:off x="6140667" y="1266470"/>
+            <a:ext cx="374822" cy="584776"/>
+          </a:xfrm>
+          <a:prstGeom prst="rect">
+            <a:avLst/>
+          </a:prstGeom>
+          <a:solidFill>
+            <a:srgbClr val="FFFF00"/>
+          </a:solidFill>
+        </p:spPr>
+        <p:txBody>
+          <a:bodyPr wrap="none" rtlCol="0">
+            <a:spAutoFit/>
+          </a:bodyPr>
+          <a:lstStyle/>
+          <a:p>
+            <a:r>
+              <a:rPr lang="en-US" sz="3200" b="1" dirty="0" smtClean="0"/>
+              <a:t>?</a:t>
+            </a:r>
+            <a:endParaRPr lang="en-US" sz="3200" b="1" dirty="0"/>
+          </a:p>
+        </p:txBody>
+      </p:sp>
+      <p:sp>
+        <p:nvSpPr>
+          <p:cNvPr id="26" name="TextBox 25"/>
+          <p:cNvSpPr txBox="1"/>
+          <p:nvPr/>
+        </p:nvSpPr>
+        <p:spPr>
+          <a:xfrm>
+            <a:off x="6724638" y="1816036"/>
+            <a:ext cx="374822" cy="584776"/>
+          </a:xfrm>
+          <a:prstGeom prst="rect">
+            <a:avLst/>
+          </a:prstGeom>
+          <a:solidFill>
+            <a:srgbClr val="FFFF00"/>
+          </a:solidFill>
+        </p:spPr>
+        <p:txBody>
+          <a:bodyPr wrap="none" rtlCol="0">
+            <a:spAutoFit/>
+          </a:bodyPr>
+          <a:lstStyle/>
+          <a:p>
+            <a:r>
+              <a:rPr lang="en-US" sz="3200" b="1" dirty="0" smtClean="0"/>
+              <a:t>?</a:t>
+            </a:r>
+            <a:endParaRPr lang="en-US" sz="3200" b="1" dirty="0"/>
+          </a:p>
+        </p:txBody>
+      </p:sp>
+      <p:sp>
+        <p:nvSpPr>
+          <p:cNvPr id="27" name="TextBox 26"/>
+          <p:cNvSpPr txBox="1"/>
+          <p:nvPr/>
+        </p:nvSpPr>
+        <p:spPr>
+          <a:xfrm>
+            <a:off x="1813872" y="138147"/>
+            <a:ext cx="1311777" cy="584776"/>
+          </a:xfrm>
+          <a:prstGeom prst="rect">
+            <a:avLst/>
+          </a:prstGeom>
+          <a:noFill/>
+        </p:spPr>
+        <p:txBody>
+          <a:bodyPr wrap="none" rtlCol="0">
+            <a:spAutoFit/>
+          </a:bodyPr>
+          <a:lstStyle/>
+          <a:p>
+            <a:r>
+              <a:rPr lang="en-US" sz="3200" b="1" dirty="0" smtClean="0"/>
+              <a:t>Events</a:t>
+            </a:r>
+            <a:endParaRPr lang="en-US" sz="3200" b="1" dirty="0"/>
+          </a:p>
+        </p:txBody>
+      </p:sp>
+      <p:cxnSp>
+        <p:nvCxnSpPr>
+          <p:cNvPr id="29" name="Straight Arrow Connector 28"/>
+          <p:cNvCxnSpPr>
+            <a:stCxn id="27" idx="2"/>
+            <a:endCxn id="7" idx="7"/>
+          </p:cNvCxnSpPr>
+          <p:nvPr/>
+        </p:nvCxnSpPr>
+        <p:spPr>
+          <a:xfrm flipH="1">
+            <a:off x="1412409" y="722923"/>
+            <a:ext cx="1057352" cy="190695"/>
+          </a:xfrm>
+          <a:prstGeom prst="straightConnector1">
+            <a:avLst/>
+          </a:prstGeom>
+          <a:ln>
+            <a:prstDash val="dash"/>
+            <a:tailEnd type="arrow"/>
+          </a:ln>
+        </p:spPr>
+        <p:style>
+          <a:lnRef idx="2">
+            <a:schemeClr val="accent1"/>
+          </a:lnRef>
+          <a:fillRef idx="0">
+            <a:schemeClr val="accent1"/>
+          </a:fillRef>
+          <a:effectRef idx="1">
+            <a:schemeClr val="accent1"/>
+          </a:effectRef>
+          <a:fontRef idx="minor">
+            <a:schemeClr val="tx1"/>
+          </a:fontRef>
+        </p:style>
+      </p:cxnSp>
+      <p:sp>
+        <p:nvSpPr>
+          <p:cNvPr id="30" name="TextBox 29"/>
+          <p:cNvSpPr txBox="1"/>
+          <p:nvPr/>
+        </p:nvSpPr>
+        <p:spPr>
+          <a:xfrm>
+            <a:off x="4881786" y="138147"/>
+            <a:ext cx="2255345" cy="584776"/>
+          </a:xfrm>
+          <a:prstGeom prst="rect">
+            <a:avLst/>
+          </a:prstGeom>
+          <a:noFill/>
+        </p:spPr>
+        <p:txBody>
+          <a:bodyPr wrap="none" rtlCol="0">
+            <a:spAutoFit/>
+          </a:bodyPr>
+          <a:lstStyle/>
+          <a:p>
+            <a:r>
+              <a:rPr lang="en-US" sz="3200" b="1" dirty="0" smtClean="0"/>
+              <a:t>Timestamps</a:t>
+            </a:r>
+            <a:endParaRPr lang="en-US" sz="3200" b="1" dirty="0"/>
+          </a:p>
+        </p:txBody>
+      </p:sp>
+      <p:cxnSp>
+        <p:nvCxnSpPr>
+          <p:cNvPr id="32" name="Straight Arrow Connector 31"/>
+          <p:cNvCxnSpPr>
+            <a:stCxn id="30" idx="2"/>
+            <a:endCxn id="22" idx="3"/>
+          </p:cNvCxnSpPr>
+          <p:nvPr/>
+        </p:nvCxnSpPr>
+        <p:spPr>
+          <a:xfrm flipH="1">
+            <a:off x="3574779" y="722923"/>
+            <a:ext cx="2434680" cy="774379"/>
+          </a:xfrm>
+          <a:prstGeom prst="straightConnector1">
+            <a:avLst/>
+          </a:prstGeom>
+          <a:ln>
+            <a:prstDash val="dash"/>
+            <a:tailEnd type="arrow"/>
+          </a:ln>
+        </p:spPr>
+        <p:style>
+          <a:lnRef idx="2">
+            <a:schemeClr val="accent1"/>
+          </a:lnRef>
+          <a:fillRef idx="0">
+            <a:schemeClr val="accent1"/>
+          </a:fillRef>
+          <a:effectRef idx="1">
+            <a:schemeClr val="accent1"/>
+          </a:effectRef>
+          <a:fontRef idx="minor">
+            <a:schemeClr val="tx1"/>
+          </a:fontRef>
+        </p:style>
+      </p:cxnSp>
+      <p:sp>
+        <p:nvSpPr>
+          <p:cNvPr id="33" name="TextBox 32"/>
+          <p:cNvSpPr txBox="1"/>
+          <p:nvPr/>
+        </p:nvSpPr>
+        <p:spPr>
+          <a:xfrm>
+            <a:off x="407228" y="5572445"/>
+            <a:ext cx="8393043" cy="584776"/>
+          </a:xfrm>
+          <a:prstGeom prst="rect">
+            <a:avLst/>
+          </a:prstGeom>
+          <a:solidFill>
+            <a:srgbClr val="CCFFCC"/>
+          </a:solidFill>
+        </p:spPr>
+        <p:txBody>
+          <a:bodyPr wrap="none" rtlCol="0">
+            <a:spAutoFit/>
+          </a:bodyPr>
+          <a:lstStyle/>
+          <a:p>
+            <a:pPr algn="ctr"/>
+            <a:r>
+              <a:rPr lang="en-US" sz="3200" b="1" dirty="0" smtClean="0"/>
+              <a:t>Vector Timestamps for Shared Memory Systems</a:t>
+            </a:r>
+            <a:endParaRPr lang="en-US" sz="3200" b="1" dirty="0"/>
+          </a:p>
+        </p:txBody>
+      </p:sp>
+    </p:spTree>
+    <p:extLst>
+      <p:ext uri="{BB962C8B-B14F-4D97-AF65-F5344CB8AC3E}">
+        <p14:creationId xmlns:p14="http://schemas.microsoft.com/office/powerpoint/2010/main" val="674231832"/>
+      </p:ext>
+    </p:extLst>
+  </p:cSld>
+  <p:clrMapOvr>
+    <a:masterClrMapping/>
+  </p:clrMapOvr>
 </p:sld>
 </file>
 

</xml_diff>